<commit_message>
Extra documentatie en include files verwijderd
</commit_message>
<xml_diff>
--- a/747-400 EPIC.pptx
+++ b/747-400 EPIC.pptx
@@ -7,6 +7,10 @@
   <p:sldIdLst>
     <p:sldId id="256" r:id="rId2"/>
     <p:sldId id="257" r:id="rId3"/>
+    <p:sldId id="258" r:id="rId4"/>
+    <p:sldId id="260" r:id="rId5"/>
+    <p:sldId id="259" r:id="rId6"/>
+    <p:sldId id="261" r:id="rId7"/>
   </p:sldIdLst>
   <p:sldSz cx="9144000" cy="6858000" type="screen4x3"/>
   <p:notesSz cx="6858000" cy="9144000"/>
@@ -289,7 +293,7 @@
           <a:p>
             <a:fld id="{0CAA59F2-031C-4F37-8DD9-C9C8B7A122A4}" type="datetimeFigureOut">
               <a:rPr lang="nl-NL" smtClean="0"/>
-              <a:t>15-8-2013</a:t>
+              <a:t>17-8-2013</a:t>
             </a:fld>
             <a:endParaRPr lang="nl-NL"/>
           </a:p>
@@ -459,7 +463,7 @@
           <a:p>
             <a:fld id="{0CAA59F2-031C-4F37-8DD9-C9C8B7A122A4}" type="datetimeFigureOut">
               <a:rPr lang="nl-NL" smtClean="0"/>
-              <a:t>15-8-2013</a:t>
+              <a:t>17-8-2013</a:t>
             </a:fld>
             <a:endParaRPr lang="nl-NL"/>
           </a:p>
@@ -639,7 +643,7 @@
           <a:p>
             <a:fld id="{0CAA59F2-031C-4F37-8DD9-C9C8B7A122A4}" type="datetimeFigureOut">
               <a:rPr lang="nl-NL" smtClean="0"/>
-              <a:t>15-8-2013</a:t>
+              <a:t>17-8-2013</a:t>
             </a:fld>
             <a:endParaRPr lang="nl-NL"/>
           </a:p>
@@ -809,7 +813,7 @@
           <a:p>
             <a:fld id="{0CAA59F2-031C-4F37-8DD9-C9C8B7A122A4}" type="datetimeFigureOut">
               <a:rPr lang="nl-NL" smtClean="0"/>
-              <a:t>15-8-2013</a:t>
+              <a:t>17-8-2013</a:t>
             </a:fld>
             <a:endParaRPr lang="nl-NL"/>
           </a:p>
@@ -1055,7 +1059,7 @@
           <a:p>
             <a:fld id="{0CAA59F2-031C-4F37-8DD9-C9C8B7A122A4}" type="datetimeFigureOut">
               <a:rPr lang="nl-NL" smtClean="0"/>
-              <a:t>15-8-2013</a:t>
+              <a:t>17-8-2013</a:t>
             </a:fld>
             <a:endParaRPr lang="nl-NL"/>
           </a:p>
@@ -1343,7 +1347,7 @@
           <a:p>
             <a:fld id="{0CAA59F2-031C-4F37-8DD9-C9C8B7A122A4}" type="datetimeFigureOut">
               <a:rPr lang="nl-NL" smtClean="0"/>
-              <a:t>15-8-2013</a:t>
+              <a:t>17-8-2013</a:t>
             </a:fld>
             <a:endParaRPr lang="nl-NL"/>
           </a:p>
@@ -1765,7 +1769,7 @@
           <a:p>
             <a:fld id="{0CAA59F2-031C-4F37-8DD9-C9C8B7A122A4}" type="datetimeFigureOut">
               <a:rPr lang="nl-NL" smtClean="0"/>
-              <a:t>15-8-2013</a:t>
+              <a:t>17-8-2013</a:t>
             </a:fld>
             <a:endParaRPr lang="nl-NL"/>
           </a:p>
@@ -1883,7 +1887,7 @@
           <a:p>
             <a:fld id="{0CAA59F2-031C-4F37-8DD9-C9C8B7A122A4}" type="datetimeFigureOut">
               <a:rPr lang="nl-NL" smtClean="0"/>
-              <a:t>15-8-2013</a:t>
+              <a:t>17-8-2013</a:t>
             </a:fld>
             <a:endParaRPr lang="nl-NL"/>
           </a:p>
@@ -1978,7 +1982,7 @@
           <a:p>
             <a:fld id="{0CAA59F2-031C-4F37-8DD9-C9C8B7A122A4}" type="datetimeFigureOut">
               <a:rPr lang="nl-NL" smtClean="0"/>
-              <a:t>15-8-2013</a:t>
+              <a:t>17-8-2013</a:t>
             </a:fld>
             <a:endParaRPr lang="nl-NL"/>
           </a:p>
@@ -2255,7 +2259,7 @@
           <a:p>
             <a:fld id="{0CAA59F2-031C-4F37-8DD9-C9C8B7A122A4}" type="datetimeFigureOut">
               <a:rPr lang="nl-NL" smtClean="0"/>
-              <a:t>15-8-2013</a:t>
+              <a:t>17-8-2013</a:t>
             </a:fld>
             <a:endParaRPr lang="nl-NL"/>
           </a:p>
@@ -2508,7 +2512,7 @@
           <a:p>
             <a:fld id="{0CAA59F2-031C-4F37-8DD9-C9C8B7A122A4}" type="datetimeFigureOut">
               <a:rPr lang="nl-NL" smtClean="0"/>
-              <a:t>15-8-2013</a:t>
+              <a:t>17-8-2013</a:t>
             </a:fld>
             <a:endParaRPr lang="nl-NL"/>
           </a:p>
@@ -2721,7 +2725,7 @@
           <a:p>
             <a:fld id="{0CAA59F2-031C-4F37-8DD9-C9C8B7A122A4}" type="datetimeFigureOut">
               <a:rPr lang="nl-NL" smtClean="0"/>
-              <a:t>15-8-2013</a:t>
+              <a:t>17-8-2013</a:t>
             </a:fld>
             <a:endParaRPr lang="nl-NL"/>
           </a:p>
@@ -3134,7 +3138,23 @@
           <a:bodyPr/>
           <a:lstStyle/>
           <a:p>
-            <a:endParaRPr lang="nl-NL"/>
+            <a:r>
+              <a:rPr lang="nl-NL" dirty="0" err="1" smtClean="0"/>
+              <a:t>With</a:t>
+            </a:r>
+            <a:r>
+              <a:rPr lang="nl-NL" dirty="0" smtClean="0"/>
+              <a:t> EPIC </a:t>
+            </a:r>
+            <a:r>
+              <a:rPr lang="nl-NL" dirty="0" err="1" smtClean="0"/>
+              <a:t>and</a:t>
+            </a:r>
+            <a:r>
+              <a:rPr lang="nl-NL" dirty="0" smtClean="0"/>
+              <a:t> Project Magenta</a:t>
+            </a:r>
+            <a:endParaRPr lang="nl-NL" dirty="0"/>
           </a:p>
         </p:txBody>
       </p:sp>
@@ -3407,10 +3427,2415 @@
           </a:p>
         </p:txBody>
       </p:sp>
+      <p:sp>
+        <p:nvSpPr>
+          <p:cNvPr id="9" name="Stroomdiagram: Document 8"/>
+          <p:cNvSpPr/>
+          <p:nvPr/>
+        </p:nvSpPr>
+        <p:spPr>
+          <a:xfrm>
+            <a:off x="236712" y="2727886"/>
+            <a:ext cx="1512168" cy="1139484"/>
+          </a:xfrm>
+          <a:prstGeom prst="flowChartDocument">
+            <a:avLst/>
+          </a:prstGeom>
+        </p:spPr>
+        <p:style>
+          <a:lnRef idx="2">
+            <a:schemeClr val="accent1">
+              <a:shade val="50000"/>
+            </a:schemeClr>
+          </a:lnRef>
+          <a:fillRef idx="1">
+            <a:schemeClr val="accent1"/>
+          </a:fillRef>
+          <a:effectRef idx="0">
+            <a:schemeClr val="accent1"/>
+          </a:effectRef>
+          <a:fontRef idx="minor">
+            <a:schemeClr val="lt1"/>
+          </a:fontRef>
+        </p:style>
+        <p:txBody>
+          <a:bodyPr rtlCol="0" anchor="ctr"/>
+          <a:lstStyle/>
+          <a:p>
+            <a:pPr algn="ctr"/>
+            <a:r>
+              <a:rPr lang="nl-NL" dirty="0" smtClean="0"/>
+              <a:t>EPICINFO.CFG</a:t>
+            </a:r>
+            <a:endParaRPr lang="nl-NL" dirty="0"/>
+          </a:p>
+        </p:txBody>
+      </p:sp>
+      <p:cxnSp>
+        <p:nvCxnSpPr>
+          <p:cNvPr id="11" name="Rechte verbindingslijn 10"/>
+          <p:cNvCxnSpPr>
+            <a:stCxn id="9" idx="3"/>
+            <a:endCxn id="6" idx="1"/>
+          </p:cNvCxnSpPr>
+          <p:nvPr/>
+        </p:nvCxnSpPr>
+        <p:spPr>
+          <a:xfrm>
+            <a:off x="1748880" y="3297628"/>
+            <a:ext cx="1055252" cy="0"/>
+          </a:xfrm>
+          <a:prstGeom prst="line">
+            <a:avLst/>
+          </a:prstGeom>
+        </p:spPr>
+        <p:style>
+          <a:lnRef idx="1">
+            <a:schemeClr val="accent1"/>
+          </a:lnRef>
+          <a:fillRef idx="0">
+            <a:schemeClr val="accent1"/>
+          </a:fillRef>
+          <a:effectRef idx="0">
+            <a:schemeClr val="accent1"/>
+          </a:effectRef>
+          <a:fontRef idx="minor">
+            <a:schemeClr val="tx1"/>
+          </a:fontRef>
+        </p:style>
+      </p:cxnSp>
     </p:spTree>
     <p:extLst>
       <p:ext uri="{BB962C8B-B14F-4D97-AF65-F5344CB8AC3E}">
         <p14:creationId xmlns:p14="http://schemas.microsoft.com/office/powerpoint/2010/main" val="521965257"/>
+      </p:ext>
+    </p:extLst>
+  </p:cSld>
+  <p:clrMapOvr>
+    <a:masterClrMapping/>
+  </p:clrMapOvr>
+</p:sld>
+</file>
+
+<file path=ppt/slides/slide3.xml><?xml version="1.0" encoding="utf-8"?>
+<p:sld xmlns:a="http://schemas.openxmlformats.org/drawingml/2006/main" xmlns:r="http://schemas.openxmlformats.org/officeDocument/2006/relationships" xmlns:p="http://schemas.openxmlformats.org/presentationml/2006/main">
+  <p:cSld>
+    <p:spTree>
+      <p:nvGrpSpPr>
+        <p:cNvPr id="1" name=""/>
+        <p:cNvGrpSpPr/>
+        <p:nvPr/>
+      </p:nvGrpSpPr>
+      <p:grpSpPr>
+        <a:xfrm>
+          <a:off x="0" y="0"/>
+          <a:ext cx="0" cy="0"/>
+          <a:chOff x="0" y="0"/>
+          <a:chExt cx="0" cy="0"/>
+        </a:xfrm>
+      </p:grpSpPr>
+      <p:sp>
+        <p:nvSpPr>
+          <p:cNvPr id="2" name="Titel 1"/>
+          <p:cNvSpPr>
+            <a:spLocks noGrp="1"/>
+          </p:cNvSpPr>
+          <p:nvPr>
+            <p:ph type="title"/>
+          </p:nvPr>
+        </p:nvSpPr>
+        <p:spPr/>
+        <p:txBody>
+          <a:bodyPr/>
+          <a:lstStyle/>
+          <a:p>
+            <a:r>
+              <a:rPr lang="nl-NL" dirty="0" smtClean="0"/>
+              <a:t>EPICINFO - EPICIO</a:t>
+            </a:r>
+            <a:endParaRPr lang="nl-NL" dirty="0"/>
+          </a:p>
+        </p:txBody>
+      </p:sp>
+      <p:sp>
+        <p:nvSpPr>
+          <p:cNvPr id="4" name="Rechthoek 3"/>
+          <p:cNvSpPr/>
+          <p:nvPr/>
+        </p:nvSpPr>
+        <p:spPr>
+          <a:xfrm>
+            <a:off x="2276181" y="3133274"/>
+            <a:ext cx="5944332" cy="288032"/>
+          </a:xfrm>
+          <a:prstGeom prst="rect">
+            <a:avLst/>
+          </a:prstGeom>
+        </p:spPr>
+        <p:style>
+          <a:lnRef idx="2">
+            <a:schemeClr val="accent1">
+              <a:shade val="50000"/>
+            </a:schemeClr>
+          </a:lnRef>
+          <a:fillRef idx="1">
+            <a:schemeClr val="accent1"/>
+          </a:fillRef>
+          <a:effectRef idx="0">
+            <a:schemeClr val="accent1"/>
+          </a:effectRef>
+          <a:fontRef idx="minor">
+            <a:schemeClr val="lt1"/>
+          </a:fontRef>
+        </p:style>
+        <p:txBody>
+          <a:bodyPr rtlCol="0" anchor="ctr"/>
+          <a:lstStyle/>
+          <a:p>
+            <a:pPr algn="ctr"/>
+            <a:r>
+              <a:rPr lang="nl-NL" dirty="0" smtClean="0"/>
+              <a:t>EPICINFO</a:t>
+            </a:r>
+            <a:endParaRPr lang="nl-NL" dirty="0"/>
+          </a:p>
+        </p:txBody>
+      </p:sp>
+      <p:sp>
+        <p:nvSpPr>
+          <p:cNvPr id="5" name="Stroomdiagram: Document 4"/>
+          <p:cNvSpPr/>
+          <p:nvPr/>
+        </p:nvSpPr>
+        <p:spPr>
+          <a:xfrm>
+            <a:off x="236712" y="2727886"/>
+            <a:ext cx="1512168" cy="1139484"/>
+          </a:xfrm>
+          <a:prstGeom prst="flowChartDocument">
+            <a:avLst/>
+          </a:prstGeom>
+        </p:spPr>
+        <p:style>
+          <a:lnRef idx="2">
+            <a:schemeClr val="accent1">
+              <a:shade val="50000"/>
+            </a:schemeClr>
+          </a:lnRef>
+          <a:fillRef idx="1">
+            <a:schemeClr val="accent1"/>
+          </a:fillRef>
+          <a:effectRef idx="0">
+            <a:schemeClr val="accent1"/>
+          </a:effectRef>
+          <a:fontRef idx="minor">
+            <a:schemeClr val="lt1"/>
+          </a:fontRef>
+        </p:style>
+        <p:txBody>
+          <a:bodyPr rtlCol="0" anchor="ctr"/>
+          <a:lstStyle/>
+          <a:p>
+            <a:pPr algn="ctr"/>
+            <a:r>
+              <a:rPr lang="nl-NL" dirty="0" smtClean="0"/>
+              <a:t>EPICINFO.CFG</a:t>
+            </a:r>
+            <a:endParaRPr lang="nl-NL" dirty="0"/>
+          </a:p>
+        </p:txBody>
+      </p:sp>
+      <p:cxnSp>
+        <p:nvCxnSpPr>
+          <p:cNvPr id="6" name="Rechte verbindingslijn 5"/>
+          <p:cNvCxnSpPr>
+            <a:stCxn id="5" idx="3"/>
+            <a:endCxn id="4" idx="1"/>
+          </p:cNvCxnSpPr>
+          <p:nvPr/>
+        </p:nvCxnSpPr>
+        <p:spPr>
+          <a:xfrm flipV="1">
+            <a:off x="1748880" y="3277290"/>
+            <a:ext cx="527301" cy="20338"/>
+          </a:xfrm>
+          <a:prstGeom prst="line">
+            <a:avLst/>
+          </a:prstGeom>
+        </p:spPr>
+        <p:style>
+          <a:lnRef idx="1">
+            <a:schemeClr val="accent1"/>
+          </a:lnRef>
+          <a:fillRef idx="0">
+            <a:schemeClr val="accent1"/>
+          </a:fillRef>
+          <a:effectRef idx="0">
+            <a:schemeClr val="accent1"/>
+          </a:effectRef>
+          <a:fontRef idx="minor">
+            <a:schemeClr val="tx1"/>
+          </a:fontRef>
+        </p:style>
+      </p:cxnSp>
+      <p:sp>
+        <p:nvSpPr>
+          <p:cNvPr id="7" name="Rechthoek 6"/>
+          <p:cNvSpPr/>
+          <p:nvPr/>
+        </p:nvSpPr>
+        <p:spPr>
+          <a:xfrm>
+            <a:off x="2276181" y="4997496"/>
+            <a:ext cx="5950500" cy="288032"/>
+          </a:xfrm>
+          <a:prstGeom prst="rect">
+            <a:avLst/>
+          </a:prstGeom>
+        </p:spPr>
+        <p:style>
+          <a:lnRef idx="2">
+            <a:schemeClr val="accent1">
+              <a:shade val="50000"/>
+            </a:schemeClr>
+          </a:lnRef>
+          <a:fillRef idx="1">
+            <a:schemeClr val="accent1"/>
+          </a:fillRef>
+          <a:effectRef idx="0">
+            <a:schemeClr val="accent1"/>
+          </a:effectRef>
+          <a:fontRef idx="minor">
+            <a:schemeClr val="lt1"/>
+          </a:fontRef>
+        </p:style>
+        <p:txBody>
+          <a:bodyPr rtlCol="0" anchor="ctr"/>
+          <a:lstStyle/>
+          <a:p>
+            <a:pPr algn="ctr"/>
+            <a:r>
+              <a:rPr lang="nl-NL" dirty="0" smtClean="0"/>
+              <a:t>EPICIO</a:t>
+            </a:r>
+            <a:endParaRPr lang="nl-NL" dirty="0"/>
+          </a:p>
+        </p:txBody>
+      </p:sp>
+      <p:sp>
+        <p:nvSpPr>
+          <p:cNvPr id="8" name="Rechthoek 7"/>
+          <p:cNvSpPr/>
+          <p:nvPr/>
+        </p:nvSpPr>
+        <p:spPr>
+          <a:xfrm>
+            <a:off x="2276181" y="3973705"/>
+            <a:ext cx="1719755" cy="432048"/>
+          </a:xfrm>
+          <a:prstGeom prst="rect">
+            <a:avLst/>
+          </a:prstGeom>
+        </p:spPr>
+        <p:style>
+          <a:lnRef idx="2">
+            <a:schemeClr val="accent1">
+              <a:shade val="50000"/>
+            </a:schemeClr>
+          </a:lnRef>
+          <a:fillRef idx="1">
+            <a:schemeClr val="accent1"/>
+          </a:fillRef>
+          <a:effectRef idx="0">
+            <a:schemeClr val="accent1"/>
+          </a:effectRef>
+          <a:fontRef idx="minor">
+            <a:schemeClr val="lt1"/>
+          </a:fontRef>
+        </p:style>
+        <p:txBody>
+          <a:bodyPr rtlCol="0" anchor="ctr"/>
+          <a:lstStyle/>
+          <a:p>
+            <a:pPr algn="ctr"/>
+            <a:r>
+              <a:rPr lang="en-GB" dirty="0" err="1"/>
+              <a:t>DefineQProc</a:t>
+            </a:r>
+            <a:endParaRPr lang="nl-NL" dirty="0"/>
+          </a:p>
+        </p:txBody>
+      </p:sp>
+      <p:sp>
+        <p:nvSpPr>
+          <p:cNvPr id="9" name="Rechthoek 8"/>
+          <p:cNvSpPr/>
+          <p:nvPr/>
+        </p:nvSpPr>
+        <p:spPr>
+          <a:xfrm>
+            <a:off x="4194232" y="3973705"/>
+            <a:ext cx="1582066" cy="432048"/>
+          </a:xfrm>
+          <a:prstGeom prst="rect">
+            <a:avLst/>
+          </a:prstGeom>
+        </p:spPr>
+        <p:style>
+          <a:lnRef idx="2">
+            <a:schemeClr val="accent1">
+              <a:shade val="50000"/>
+            </a:schemeClr>
+          </a:lnRef>
+          <a:fillRef idx="1">
+            <a:schemeClr val="accent1"/>
+          </a:fillRef>
+          <a:effectRef idx="0">
+            <a:schemeClr val="accent1"/>
+          </a:effectRef>
+          <a:fontRef idx="minor">
+            <a:schemeClr val="lt1"/>
+          </a:fontRef>
+        </p:style>
+        <p:txBody>
+          <a:bodyPr rtlCol="0" anchor="ctr"/>
+          <a:lstStyle/>
+          <a:p>
+            <a:pPr algn="ctr"/>
+            <a:r>
+              <a:rPr lang="en-GB" dirty="0"/>
+              <a:t>Pigeon Holes</a:t>
+            </a:r>
+            <a:endParaRPr lang="nl-NL" dirty="0"/>
+          </a:p>
+        </p:txBody>
+      </p:sp>
+      <p:cxnSp>
+        <p:nvCxnSpPr>
+          <p:cNvPr id="13" name="Rechte verbindingslijn met pijl 12"/>
+          <p:cNvCxnSpPr>
+            <a:endCxn id="8" idx="0"/>
+          </p:cNvCxnSpPr>
+          <p:nvPr/>
+        </p:nvCxnSpPr>
+        <p:spPr>
+          <a:xfrm>
+            <a:off x="3136058" y="3421306"/>
+            <a:ext cx="1" cy="552399"/>
+          </a:xfrm>
+          <a:prstGeom prst="straightConnector1">
+            <a:avLst/>
+          </a:prstGeom>
+          <a:ln>
+            <a:tailEnd type="arrow"/>
+          </a:ln>
+        </p:spPr>
+        <p:style>
+          <a:lnRef idx="1">
+            <a:schemeClr val="accent1"/>
+          </a:lnRef>
+          <a:fillRef idx="0">
+            <a:schemeClr val="accent1"/>
+          </a:fillRef>
+          <a:effectRef idx="0">
+            <a:schemeClr val="accent1"/>
+          </a:effectRef>
+          <a:fontRef idx="minor">
+            <a:schemeClr val="tx1"/>
+          </a:fontRef>
+        </p:style>
+      </p:cxnSp>
+      <p:cxnSp>
+        <p:nvCxnSpPr>
+          <p:cNvPr id="15" name="Rechte verbindingslijn met pijl 14"/>
+          <p:cNvCxnSpPr>
+            <a:endCxn id="9" idx="0"/>
+          </p:cNvCxnSpPr>
+          <p:nvPr/>
+        </p:nvCxnSpPr>
+        <p:spPr>
+          <a:xfrm>
+            <a:off x="4985265" y="3421306"/>
+            <a:ext cx="0" cy="552399"/>
+          </a:xfrm>
+          <a:prstGeom prst="straightConnector1">
+            <a:avLst/>
+          </a:prstGeom>
+          <a:ln>
+            <a:tailEnd type="arrow"/>
+          </a:ln>
+        </p:spPr>
+        <p:style>
+          <a:lnRef idx="1">
+            <a:schemeClr val="accent1"/>
+          </a:lnRef>
+          <a:fillRef idx="0">
+            <a:schemeClr val="accent1"/>
+          </a:fillRef>
+          <a:effectRef idx="0">
+            <a:schemeClr val="accent1"/>
+          </a:effectRef>
+          <a:fontRef idx="minor">
+            <a:schemeClr val="tx1"/>
+          </a:fontRef>
+        </p:style>
+      </p:cxnSp>
+      <p:sp>
+        <p:nvSpPr>
+          <p:cNvPr id="16" name="Rechthoek 15"/>
+          <p:cNvSpPr/>
+          <p:nvPr/>
+        </p:nvSpPr>
+        <p:spPr>
+          <a:xfrm>
+            <a:off x="6210456" y="3973705"/>
+            <a:ext cx="2016224" cy="432048"/>
+          </a:xfrm>
+          <a:prstGeom prst="rect">
+            <a:avLst/>
+          </a:prstGeom>
+        </p:spPr>
+        <p:style>
+          <a:lnRef idx="2">
+            <a:schemeClr val="accent1">
+              <a:shade val="50000"/>
+            </a:schemeClr>
+          </a:lnRef>
+          <a:fillRef idx="1">
+            <a:schemeClr val="accent1"/>
+          </a:fillRef>
+          <a:effectRef idx="0">
+            <a:schemeClr val="accent1"/>
+          </a:effectRef>
+          <a:fontRef idx="minor">
+            <a:schemeClr val="lt1"/>
+          </a:fontRef>
+        </p:style>
+        <p:txBody>
+          <a:bodyPr rtlCol="0" anchor="ctr"/>
+          <a:lstStyle/>
+          <a:p>
+            <a:pPr algn="ctr"/>
+            <a:r>
+              <a:rPr lang="en-GB" dirty="0" err="1" smtClean="0"/>
+              <a:t>Nqw</a:t>
+            </a:r>
+            <a:endParaRPr lang="nl-NL" dirty="0"/>
+          </a:p>
+        </p:txBody>
+      </p:sp>
+      <p:cxnSp>
+        <p:nvCxnSpPr>
+          <p:cNvPr id="24" name="Rechte verbindingslijn met pijl 23"/>
+          <p:cNvCxnSpPr>
+            <a:stCxn id="16" idx="0"/>
+          </p:cNvCxnSpPr>
+          <p:nvPr/>
+        </p:nvCxnSpPr>
+        <p:spPr>
+          <a:xfrm flipV="1">
+            <a:off x="7218568" y="3421306"/>
+            <a:ext cx="0" cy="552399"/>
+          </a:xfrm>
+          <a:prstGeom prst="straightConnector1">
+            <a:avLst/>
+          </a:prstGeom>
+          <a:ln>
+            <a:tailEnd type="arrow"/>
+          </a:ln>
+        </p:spPr>
+        <p:style>
+          <a:lnRef idx="1">
+            <a:schemeClr val="accent1"/>
+          </a:lnRef>
+          <a:fillRef idx="0">
+            <a:schemeClr val="accent1"/>
+          </a:fillRef>
+          <a:effectRef idx="0">
+            <a:schemeClr val="accent1"/>
+          </a:effectRef>
+          <a:fontRef idx="minor">
+            <a:schemeClr val="tx1"/>
+          </a:fontRef>
+        </p:style>
+      </p:cxnSp>
+      <p:cxnSp>
+        <p:nvCxnSpPr>
+          <p:cNvPr id="26" name="Rechte verbindingslijn met pijl 25"/>
+          <p:cNvCxnSpPr>
+            <a:endCxn id="16" idx="2"/>
+          </p:cNvCxnSpPr>
+          <p:nvPr/>
+        </p:nvCxnSpPr>
+        <p:spPr>
+          <a:xfrm flipV="1">
+            <a:off x="7218568" y="4405753"/>
+            <a:ext cx="0" cy="591743"/>
+          </a:xfrm>
+          <a:prstGeom prst="straightConnector1">
+            <a:avLst/>
+          </a:prstGeom>
+          <a:ln>
+            <a:tailEnd type="arrow"/>
+          </a:ln>
+        </p:spPr>
+        <p:style>
+          <a:lnRef idx="1">
+            <a:schemeClr val="accent1"/>
+          </a:lnRef>
+          <a:fillRef idx="0">
+            <a:schemeClr val="accent1"/>
+          </a:fillRef>
+          <a:effectRef idx="0">
+            <a:schemeClr val="accent1"/>
+          </a:effectRef>
+          <a:fontRef idx="minor">
+            <a:schemeClr val="tx1"/>
+          </a:fontRef>
+        </p:style>
+      </p:cxnSp>
+      <p:cxnSp>
+        <p:nvCxnSpPr>
+          <p:cNvPr id="28" name="Rechte verbindingslijn met pijl 27"/>
+          <p:cNvCxnSpPr>
+            <a:stCxn id="9" idx="2"/>
+          </p:cNvCxnSpPr>
+          <p:nvPr/>
+        </p:nvCxnSpPr>
+        <p:spPr>
+          <a:xfrm>
+            <a:off x="4985265" y="4405753"/>
+            <a:ext cx="0" cy="591743"/>
+          </a:xfrm>
+          <a:prstGeom prst="straightConnector1">
+            <a:avLst/>
+          </a:prstGeom>
+          <a:ln>
+            <a:tailEnd type="arrow"/>
+          </a:ln>
+        </p:spPr>
+        <p:style>
+          <a:lnRef idx="1">
+            <a:schemeClr val="accent1"/>
+          </a:lnRef>
+          <a:fillRef idx="0">
+            <a:schemeClr val="accent1"/>
+          </a:fillRef>
+          <a:effectRef idx="0">
+            <a:schemeClr val="accent1"/>
+          </a:effectRef>
+          <a:fontRef idx="minor">
+            <a:schemeClr val="tx1"/>
+          </a:fontRef>
+        </p:style>
+      </p:cxnSp>
+      <p:cxnSp>
+        <p:nvCxnSpPr>
+          <p:cNvPr id="30" name="Rechte verbindingslijn met pijl 29"/>
+          <p:cNvCxnSpPr>
+            <a:stCxn id="8" idx="2"/>
+          </p:cNvCxnSpPr>
+          <p:nvPr/>
+        </p:nvCxnSpPr>
+        <p:spPr>
+          <a:xfrm flipH="1">
+            <a:off x="3136058" y="4405753"/>
+            <a:ext cx="1" cy="591743"/>
+          </a:xfrm>
+          <a:prstGeom prst="straightConnector1">
+            <a:avLst/>
+          </a:prstGeom>
+          <a:ln>
+            <a:tailEnd type="arrow"/>
+          </a:ln>
+        </p:spPr>
+        <p:style>
+          <a:lnRef idx="1">
+            <a:schemeClr val="accent1"/>
+          </a:lnRef>
+          <a:fillRef idx="0">
+            <a:schemeClr val="accent1"/>
+          </a:fillRef>
+          <a:effectRef idx="0">
+            <a:schemeClr val="accent1"/>
+          </a:effectRef>
+          <a:fontRef idx="minor">
+            <a:schemeClr val="tx1"/>
+          </a:fontRef>
+        </p:style>
+      </p:cxnSp>
+    </p:spTree>
+    <p:extLst>
+      <p:ext uri="{BB962C8B-B14F-4D97-AF65-F5344CB8AC3E}">
+        <p14:creationId xmlns:p14="http://schemas.microsoft.com/office/powerpoint/2010/main" val="1584675501"/>
+      </p:ext>
+    </p:extLst>
+  </p:cSld>
+  <p:clrMapOvr>
+    <a:masterClrMapping/>
+  </p:clrMapOvr>
+</p:sld>
+</file>
+
+<file path=ppt/slides/slide4.xml><?xml version="1.0" encoding="utf-8"?>
+<p:sld xmlns:a="http://schemas.openxmlformats.org/drawingml/2006/main" xmlns:r="http://schemas.openxmlformats.org/officeDocument/2006/relationships" xmlns:p="http://schemas.openxmlformats.org/presentationml/2006/main">
+  <p:cSld>
+    <p:spTree>
+      <p:nvGrpSpPr>
+        <p:cNvPr id="1" name=""/>
+        <p:cNvGrpSpPr/>
+        <p:nvPr/>
+      </p:nvGrpSpPr>
+      <p:grpSpPr>
+        <a:xfrm>
+          <a:off x="0" y="0"/>
+          <a:ext cx="0" cy="0"/>
+          <a:chOff x="0" y="0"/>
+          <a:chExt cx="0" cy="0"/>
+        </a:xfrm>
+      </p:grpSpPr>
+      <p:sp>
+        <p:nvSpPr>
+          <p:cNvPr id="2" name="Titel 1"/>
+          <p:cNvSpPr>
+            <a:spLocks noGrp="1"/>
+          </p:cNvSpPr>
+          <p:nvPr>
+            <p:ph type="title"/>
+          </p:nvPr>
+        </p:nvSpPr>
+        <p:spPr/>
+        <p:txBody>
+          <a:bodyPr/>
+          <a:lstStyle/>
+          <a:p>
+            <a:r>
+              <a:rPr lang="nl-NL" dirty="0" smtClean="0"/>
+              <a:t>EPICINFO - EPICIO</a:t>
+            </a:r>
+            <a:endParaRPr lang="nl-NL" dirty="0"/>
+          </a:p>
+        </p:txBody>
+      </p:sp>
+      <p:sp>
+        <p:nvSpPr>
+          <p:cNvPr id="4" name="Rechthoek 3"/>
+          <p:cNvSpPr/>
+          <p:nvPr/>
+        </p:nvSpPr>
+        <p:spPr>
+          <a:xfrm>
+            <a:off x="2276181" y="3133274"/>
+            <a:ext cx="5944332" cy="288032"/>
+          </a:xfrm>
+          <a:prstGeom prst="rect">
+            <a:avLst/>
+          </a:prstGeom>
+        </p:spPr>
+        <p:style>
+          <a:lnRef idx="2">
+            <a:schemeClr val="accent1">
+              <a:shade val="50000"/>
+            </a:schemeClr>
+          </a:lnRef>
+          <a:fillRef idx="1">
+            <a:schemeClr val="accent1"/>
+          </a:fillRef>
+          <a:effectRef idx="0">
+            <a:schemeClr val="accent1"/>
+          </a:effectRef>
+          <a:fontRef idx="minor">
+            <a:schemeClr val="lt1"/>
+          </a:fontRef>
+        </p:style>
+        <p:txBody>
+          <a:bodyPr rtlCol="0" anchor="ctr"/>
+          <a:lstStyle/>
+          <a:p>
+            <a:pPr algn="ctr"/>
+            <a:r>
+              <a:rPr lang="nl-NL" dirty="0" smtClean="0"/>
+              <a:t>EPICINFO</a:t>
+            </a:r>
+            <a:endParaRPr lang="nl-NL" dirty="0"/>
+          </a:p>
+        </p:txBody>
+      </p:sp>
+      <p:sp>
+        <p:nvSpPr>
+          <p:cNvPr id="5" name="Stroomdiagram: Document 4"/>
+          <p:cNvSpPr/>
+          <p:nvPr/>
+        </p:nvSpPr>
+        <p:spPr>
+          <a:xfrm>
+            <a:off x="236712" y="2727886"/>
+            <a:ext cx="1512168" cy="1139484"/>
+          </a:xfrm>
+          <a:prstGeom prst="flowChartDocument">
+            <a:avLst/>
+          </a:prstGeom>
+        </p:spPr>
+        <p:style>
+          <a:lnRef idx="2">
+            <a:schemeClr val="accent1">
+              <a:shade val="50000"/>
+            </a:schemeClr>
+          </a:lnRef>
+          <a:fillRef idx="1">
+            <a:schemeClr val="accent1"/>
+          </a:fillRef>
+          <a:effectRef idx="0">
+            <a:schemeClr val="accent1"/>
+          </a:effectRef>
+          <a:fontRef idx="minor">
+            <a:schemeClr val="lt1"/>
+          </a:fontRef>
+        </p:style>
+        <p:txBody>
+          <a:bodyPr rtlCol="0" anchor="ctr"/>
+          <a:lstStyle/>
+          <a:p>
+            <a:pPr algn="ctr"/>
+            <a:r>
+              <a:rPr lang="nl-NL" dirty="0" smtClean="0"/>
+              <a:t>EPICINFO.CFG</a:t>
+            </a:r>
+            <a:endParaRPr lang="nl-NL" dirty="0"/>
+          </a:p>
+        </p:txBody>
+      </p:sp>
+      <p:cxnSp>
+        <p:nvCxnSpPr>
+          <p:cNvPr id="6" name="Rechte verbindingslijn 5"/>
+          <p:cNvCxnSpPr>
+            <a:stCxn id="5" idx="3"/>
+            <a:endCxn id="4" idx="1"/>
+          </p:cNvCxnSpPr>
+          <p:nvPr/>
+        </p:nvCxnSpPr>
+        <p:spPr>
+          <a:xfrm flipV="1">
+            <a:off x="1748880" y="3277290"/>
+            <a:ext cx="527301" cy="20338"/>
+          </a:xfrm>
+          <a:prstGeom prst="line">
+            <a:avLst/>
+          </a:prstGeom>
+        </p:spPr>
+        <p:style>
+          <a:lnRef idx="1">
+            <a:schemeClr val="accent1"/>
+          </a:lnRef>
+          <a:fillRef idx="0">
+            <a:schemeClr val="accent1"/>
+          </a:fillRef>
+          <a:effectRef idx="0">
+            <a:schemeClr val="accent1"/>
+          </a:effectRef>
+          <a:fontRef idx="minor">
+            <a:schemeClr val="tx1"/>
+          </a:fontRef>
+        </p:style>
+      </p:cxnSp>
+      <p:sp>
+        <p:nvSpPr>
+          <p:cNvPr id="7" name="Rechthoek 6"/>
+          <p:cNvSpPr/>
+          <p:nvPr/>
+        </p:nvSpPr>
+        <p:spPr>
+          <a:xfrm>
+            <a:off x="2276181" y="4997496"/>
+            <a:ext cx="3231923" cy="288032"/>
+          </a:xfrm>
+          <a:prstGeom prst="rect">
+            <a:avLst/>
+          </a:prstGeom>
+        </p:spPr>
+        <p:style>
+          <a:lnRef idx="2">
+            <a:schemeClr val="accent1">
+              <a:shade val="50000"/>
+            </a:schemeClr>
+          </a:lnRef>
+          <a:fillRef idx="1">
+            <a:schemeClr val="accent1"/>
+          </a:fillRef>
+          <a:effectRef idx="0">
+            <a:schemeClr val="accent1"/>
+          </a:effectRef>
+          <a:fontRef idx="minor">
+            <a:schemeClr val="lt1"/>
+          </a:fontRef>
+        </p:style>
+        <p:txBody>
+          <a:bodyPr rtlCol="0" anchor="ctr"/>
+          <a:lstStyle/>
+          <a:p>
+            <a:pPr algn="ctr"/>
+            <a:r>
+              <a:rPr lang="nl-NL" dirty="0" smtClean="0"/>
+              <a:t>EPICIO INPUT</a:t>
+            </a:r>
+            <a:endParaRPr lang="nl-NL" dirty="0"/>
+          </a:p>
+        </p:txBody>
+      </p:sp>
+      <p:sp>
+        <p:nvSpPr>
+          <p:cNvPr id="8" name="Rechthoek 7"/>
+          <p:cNvSpPr/>
+          <p:nvPr/>
+        </p:nvSpPr>
+        <p:spPr>
+          <a:xfrm>
+            <a:off x="2276181" y="3973705"/>
+            <a:ext cx="1719755" cy="432048"/>
+          </a:xfrm>
+          <a:prstGeom prst="rect">
+            <a:avLst/>
+          </a:prstGeom>
+        </p:spPr>
+        <p:style>
+          <a:lnRef idx="2">
+            <a:schemeClr val="accent1">
+              <a:shade val="50000"/>
+            </a:schemeClr>
+          </a:lnRef>
+          <a:fillRef idx="1">
+            <a:schemeClr val="accent1"/>
+          </a:fillRef>
+          <a:effectRef idx="0">
+            <a:schemeClr val="accent1"/>
+          </a:effectRef>
+          <a:fontRef idx="minor">
+            <a:schemeClr val="lt1"/>
+          </a:fontRef>
+        </p:style>
+        <p:txBody>
+          <a:bodyPr rtlCol="0" anchor="ctr"/>
+          <a:lstStyle/>
+          <a:p>
+            <a:pPr algn="ctr"/>
+            <a:r>
+              <a:rPr lang="en-GB" dirty="0" err="1"/>
+              <a:t>DefineQProc</a:t>
+            </a:r>
+            <a:endParaRPr lang="nl-NL" dirty="0"/>
+          </a:p>
+        </p:txBody>
+      </p:sp>
+      <p:sp>
+        <p:nvSpPr>
+          <p:cNvPr id="9" name="Rechthoek 8"/>
+          <p:cNvSpPr/>
+          <p:nvPr/>
+        </p:nvSpPr>
+        <p:spPr>
+          <a:xfrm>
+            <a:off x="4194232" y="3973705"/>
+            <a:ext cx="1582066" cy="432048"/>
+          </a:xfrm>
+          <a:prstGeom prst="rect">
+            <a:avLst/>
+          </a:prstGeom>
+        </p:spPr>
+        <p:style>
+          <a:lnRef idx="2">
+            <a:schemeClr val="accent1">
+              <a:shade val="50000"/>
+            </a:schemeClr>
+          </a:lnRef>
+          <a:fillRef idx="1">
+            <a:schemeClr val="accent1"/>
+          </a:fillRef>
+          <a:effectRef idx="0">
+            <a:schemeClr val="accent1"/>
+          </a:effectRef>
+          <a:fontRef idx="minor">
+            <a:schemeClr val="lt1"/>
+          </a:fontRef>
+        </p:style>
+        <p:txBody>
+          <a:bodyPr rtlCol="0" anchor="ctr"/>
+          <a:lstStyle/>
+          <a:p>
+            <a:pPr algn="ctr"/>
+            <a:r>
+              <a:rPr lang="en-GB" dirty="0"/>
+              <a:t>Pigeon Holes</a:t>
+            </a:r>
+            <a:endParaRPr lang="nl-NL" dirty="0"/>
+          </a:p>
+        </p:txBody>
+      </p:sp>
+      <p:cxnSp>
+        <p:nvCxnSpPr>
+          <p:cNvPr id="13" name="Rechte verbindingslijn met pijl 12"/>
+          <p:cNvCxnSpPr>
+            <a:endCxn id="8" idx="0"/>
+          </p:cNvCxnSpPr>
+          <p:nvPr/>
+        </p:nvCxnSpPr>
+        <p:spPr>
+          <a:xfrm>
+            <a:off x="3136058" y="3421306"/>
+            <a:ext cx="1" cy="552399"/>
+          </a:xfrm>
+          <a:prstGeom prst="straightConnector1">
+            <a:avLst/>
+          </a:prstGeom>
+          <a:ln>
+            <a:tailEnd type="arrow"/>
+          </a:ln>
+        </p:spPr>
+        <p:style>
+          <a:lnRef idx="1">
+            <a:schemeClr val="accent1"/>
+          </a:lnRef>
+          <a:fillRef idx="0">
+            <a:schemeClr val="accent1"/>
+          </a:fillRef>
+          <a:effectRef idx="0">
+            <a:schemeClr val="accent1"/>
+          </a:effectRef>
+          <a:fontRef idx="minor">
+            <a:schemeClr val="tx1"/>
+          </a:fontRef>
+        </p:style>
+      </p:cxnSp>
+      <p:cxnSp>
+        <p:nvCxnSpPr>
+          <p:cNvPr id="15" name="Rechte verbindingslijn met pijl 14"/>
+          <p:cNvCxnSpPr>
+            <a:endCxn id="9" idx="0"/>
+          </p:cNvCxnSpPr>
+          <p:nvPr/>
+        </p:nvCxnSpPr>
+        <p:spPr>
+          <a:xfrm>
+            <a:off x="4985265" y="3421306"/>
+            <a:ext cx="0" cy="552399"/>
+          </a:xfrm>
+          <a:prstGeom prst="straightConnector1">
+            <a:avLst/>
+          </a:prstGeom>
+          <a:ln>
+            <a:tailEnd type="arrow"/>
+          </a:ln>
+        </p:spPr>
+        <p:style>
+          <a:lnRef idx="1">
+            <a:schemeClr val="accent1"/>
+          </a:lnRef>
+          <a:fillRef idx="0">
+            <a:schemeClr val="accent1"/>
+          </a:fillRef>
+          <a:effectRef idx="0">
+            <a:schemeClr val="accent1"/>
+          </a:effectRef>
+          <a:fontRef idx="minor">
+            <a:schemeClr val="tx1"/>
+          </a:fontRef>
+        </p:style>
+      </p:cxnSp>
+      <p:sp>
+        <p:nvSpPr>
+          <p:cNvPr id="16" name="Rechthoek 15"/>
+          <p:cNvSpPr/>
+          <p:nvPr/>
+        </p:nvSpPr>
+        <p:spPr>
+          <a:xfrm>
+            <a:off x="6210456" y="3973705"/>
+            <a:ext cx="2016224" cy="432048"/>
+          </a:xfrm>
+          <a:prstGeom prst="rect">
+            <a:avLst/>
+          </a:prstGeom>
+        </p:spPr>
+        <p:style>
+          <a:lnRef idx="2">
+            <a:schemeClr val="accent1">
+              <a:shade val="50000"/>
+            </a:schemeClr>
+          </a:lnRef>
+          <a:fillRef idx="1">
+            <a:schemeClr val="accent1"/>
+          </a:fillRef>
+          <a:effectRef idx="0">
+            <a:schemeClr val="accent1"/>
+          </a:effectRef>
+          <a:fontRef idx="minor">
+            <a:schemeClr val="lt1"/>
+          </a:fontRef>
+        </p:style>
+        <p:txBody>
+          <a:bodyPr rtlCol="0" anchor="ctr"/>
+          <a:lstStyle/>
+          <a:p>
+            <a:pPr algn="ctr"/>
+            <a:r>
+              <a:rPr lang="en-GB" dirty="0" err="1" smtClean="0"/>
+              <a:t>Nqw</a:t>
+            </a:r>
+            <a:endParaRPr lang="nl-NL" dirty="0"/>
+          </a:p>
+        </p:txBody>
+      </p:sp>
+      <p:cxnSp>
+        <p:nvCxnSpPr>
+          <p:cNvPr id="24" name="Rechte verbindingslijn met pijl 23"/>
+          <p:cNvCxnSpPr>
+            <a:stCxn id="16" idx="0"/>
+          </p:cNvCxnSpPr>
+          <p:nvPr/>
+        </p:nvCxnSpPr>
+        <p:spPr>
+          <a:xfrm flipV="1">
+            <a:off x="7218568" y="3421306"/>
+            <a:ext cx="0" cy="552399"/>
+          </a:xfrm>
+          <a:prstGeom prst="straightConnector1">
+            <a:avLst/>
+          </a:prstGeom>
+          <a:ln>
+            <a:tailEnd type="arrow"/>
+          </a:ln>
+        </p:spPr>
+        <p:style>
+          <a:lnRef idx="1">
+            <a:schemeClr val="accent1"/>
+          </a:lnRef>
+          <a:fillRef idx="0">
+            <a:schemeClr val="accent1"/>
+          </a:fillRef>
+          <a:effectRef idx="0">
+            <a:schemeClr val="accent1"/>
+          </a:effectRef>
+          <a:fontRef idx="minor">
+            <a:schemeClr val="tx1"/>
+          </a:fontRef>
+        </p:style>
+      </p:cxnSp>
+      <p:cxnSp>
+        <p:nvCxnSpPr>
+          <p:cNvPr id="26" name="Rechte verbindingslijn met pijl 25"/>
+          <p:cNvCxnSpPr>
+            <a:endCxn id="16" idx="2"/>
+          </p:cNvCxnSpPr>
+          <p:nvPr/>
+        </p:nvCxnSpPr>
+        <p:spPr>
+          <a:xfrm flipV="1">
+            <a:off x="7218568" y="4405753"/>
+            <a:ext cx="0" cy="591743"/>
+          </a:xfrm>
+          <a:prstGeom prst="straightConnector1">
+            <a:avLst/>
+          </a:prstGeom>
+          <a:ln>
+            <a:tailEnd type="arrow"/>
+          </a:ln>
+        </p:spPr>
+        <p:style>
+          <a:lnRef idx="1">
+            <a:schemeClr val="accent1"/>
+          </a:lnRef>
+          <a:fillRef idx="0">
+            <a:schemeClr val="accent1"/>
+          </a:fillRef>
+          <a:effectRef idx="0">
+            <a:schemeClr val="accent1"/>
+          </a:effectRef>
+          <a:fontRef idx="minor">
+            <a:schemeClr val="tx1"/>
+          </a:fontRef>
+        </p:style>
+      </p:cxnSp>
+      <p:cxnSp>
+        <p:nvCxnSpPr>
+          <p:cNvPr id="28" name="Rechte verbindingslijn met pijl 27"/>
+          <p:cNvCxnSpPr>
+            <a:stCxn id="9" idx="2"/>
+          </p:cNvCxnSpPr>
+          <p:nvPr/>
+        </p:nvCxnSpPr>
+        <p:spPr>
+          <a:xfrm>
+            <a:off x="4985265" y="4405753"/>
+            <a:ext cx="0" cy="591743"/>
+          </a:xfrm>
+          <a:prstGeom prst="straightConnector1">
+            <a:avLst/>
+          </a:prstGeom>
+          <a:ln>
+            <a:tailEnd type="arrow"/>
+          </a:ln>
+        </p:spPr>
+        <p:style>
+          <a:lnRef idx="1">
+            <a:schemeClr val="accent1"/>
+          </a:lnRef>
+          <a:fillRef idx="0">
+            <a:schemeClr val="accent1"/>
+          </a:fillRef>
+          <a:effectRef idx="0">
+            <a:schemeClr val="accent1"/>
+          </a:effectRef>
+          <a:fontRef idx="minor">
+            <a:schemeClr val="tx1"/>
+          </a:fontRef>
+        </p:style>
+      </p:cxnSp>
+      <p:cxnSp>
+        <p:nvCxnSpPr>
+          <p:cNvPr id="30" name="Rechte verbindingslijn met pijl 29"/>
+          <p:cNvCxnSpPr>
+            <a:stCxn id="8" idx="2"/>
+          </p:cNvCxnSpPr>
+          <p:nvPr/>
+        </p:nvCxnSpPr>
+        <p:spPr>
+          <a:xfrm flipH="1">
+            <a:off x="3136058" y="4405753"/>
+            <a:ext cx="1" cy="591743"/>
+          </a:xfrm>
+          <a:prstGeom prst="straightConnector1">
+            <a:avLst/>
+          </a:prstGeom>
+          <a:ln>
+            <a:tailEnd type="arrow"/>
+          </a:ln>
+        </p:spPr>
+        <p:style>
+          <a:lnRef idx="1">
+            <a:schemeClr val="accent1"/>
+          </a:lnRef>
+          <a:fillRef idx="0">
+            <a:schemeClr val="accent1"/>
+          </a:fillRef>
+          <a:effectRef idx="0">
+            <a:schemeClr val="accent1"/>
+          </a:effectRef>
+          <a:fontRef idx="minor">
+            <a:schemeClr val="tx1"/>
+          </a:fontRef>
+        </p:style>
+      </p:cxnSp>
+      <p:sp>
+        <p:nvSpPr>
+          <p:cNvPr id="17" name="Rechthoek 16"/>
+          <p:cNvSpPr/>
+          <p:nvPr/>
+        </p:nvSpPr>
+        <p:spPr>
+          <a:xfrm>
+            <a:off x="5741329" y="4997496"/>
+            <a:ext cx="2712409" cy="288032"/>
+          </a:xfrm>
+          <a:prstGeom prst="rect">
+            <a:avLst/>
+          </a:prstGeom>
+        </p:spPr>
+        <p:style>
+          <a:lnRef idx="2">
+            <a:schemeClr val="accent1">
+              <a:shade val="50000"/>
+            </a:schemeClr>
+          </a:lnRef>
+          <a:fillRef idx="1">
+            <a:schemeClr val="accent1"/>
+          </a:fillRef>
+          <a:effectRef idx="0">
+            <a:schemeClr val="accent1"/>
+          </a:effectRef>
+          <a:fontRef idx="minor">
+            <a:schemeClr val="lt1"/>
+          </a:fontRef>
+        </p:style>
+        <p:txBody>
+          <a:bodyPr rtlCol="0" anchor="ctr"/>
+          <a:lstStyle/>
+          <a:p>
+            <a:pPr algn="ctr"/>
+            <a:r>
+              <a:rPr lang="nl-NL" dirty="0" smtClean="0"/>
+              <a:t>EPICIO OUTPUT</a:t>
+            </a:r>
+            <a:endParaRPr lang="nl-NL" dirty="0"/>
+          </a:p>
+        </p:txBody>
+      </p:sp>
+      <p:sp>
+        <p:nvSpPr>
+          <p:cNvPr id="18" name="Rechthoek 17"/>
+          <p:cNvSpPr/>
+          <p:nvPr/>
+        </p:nvSpPr>
+        <p:spPr>
+          <a:xfrm>
+            <a:off x="7214514" y="5661248"/>
+            <a:ext cx="1239224" cy="914400"/>
+          </a:xfrm>
+          <a:prstGeom prst="rect">
+            <a:avLst/>
+          </a:prstGeom>
+        </p:spPr>
+        <p:style>
+          <a:lnRef idx="2">
+            <a:schemeClr val="accent1">
+              <a:shade val="50000"/>
+            </a:schemeClr>
+          </a:lnRef>
+          <a:fillRef idx="1">
+            <a:schemeClr val="accent1"/>
+          </a:fillRef>
+          <a:effectRef idx="0">
+            <a:schemeClr val="accent1"/>
+          </a:effectRef>
+          <a:fontRef idx="minor">
+            <a:schemeClr val="lt1"/>
+          </a:fontRef>
+        </p:style>
+        <p:txBody>
+          <a:bodyPr rtlCol="0" anchor="ctr"/>
+          <a:lstStyle/>
+          <a:p>
+            <a:pPr algn="ctr"/>
+            <a:r>
+              <a:rPr lang="nl-NL" smtClean="0"/>
+              <a:t>64BTN Module</a:t>
+            </a:r>
+            <a:endParaRPr lang="nl-NL" dirty="0"/>
+          </a:p>
+        </p:txBody>
+      </p:sp>
+      <p:sp>
+        <p:nvSpPr>
+          <p:cNvPr id="19" name="Rechthoek 18"/>
+          <p:cNvSpPr/>
+          <p:nvPr/>
+        </p:nvSpPr>
+        <p:spPr>
+          <a:xfrm>
+            <a:off x="5776298" y="5661248"/>
+            <a:ext cx="1354630" cy="914400"/>
+          </a:xfrm>
+          <a:prstGeom prst="rect">
+            <a:avLst/>
+          </a:prstGeom>
+        </p:spPr>
+        <p:style>
+          <a:lnRef idx="2">
+            <a:schemeClr val="accent1">
+              <a:shade val="50000"/>
+            </a:schemeClr>
+          </a:lnRef>
+          <a:fillRef idx="1">
+            <a:schemeClr val="accent1"/>
+          </a:fillRef>
+          <a:effectRef idx="0">
+            <a:schemeClr val="accent1"/>
+          </a:effectRef>
+          <a:fontRef idx="minor">
+            <a:schemeClr val="lt1"/>
+          </a:fontRef>
+        </p:style>
+        <p:txBody>
+          <a:bodyPr rtlCol="0" anchor="ctr"/>
+          <a:lstStyle/>
+          <a:p>
+            <a:pPr algn="ctr"/>
+            <a:r>
+              <a:rPr lang="nl-NL" dirty="0" smtClean="0"/>
+              <a:t>Rotary Module </a:t>
+            </a:r>
+            <a:endParaRPr lang="nl-NL" dirty="0"/>
+          </a:p>
+        </p:txBody>
+      </p:sp>
+      <p:cxnSp>
+        <p:nvCxnSpPr>
+          <p:cNvPr id="10" name="Rechte verbindingslijn met pijl 9"/>
+          <p:cNvCxnSpPr>
+            <a:stCxn id="19" idx="0"/>
+          </p:cNvCxnSpPr>
+          <p:nvPr/>
+        </p:nvCxnSpPr>
+        <p:spPr>
+          <a:xfrm flipV="1">
+            <a:off x="6453613" y="5285528"/>
+            <a:ext cx="0" cy="375720"/>
+          </a:xfrm>
+          <a:prstGeom prst="straightConnector1">
+            <a:avLst/>
+          </a:prstGeom>
+          <a:ln>
+            <a:tailEnd type="arrow"/>
+          </a:ln>
+        </p:spPr>
+        <p:style>
+          <a:lnRef idx="1">
+            <a:schemeClr val="accent1"/>
+          </a:lnRef>
+          <a:fillRef idx="0">
+            <a:schemeClr val="accent1"/>
+          </a:fillRef>
+          <a:effectRef idx="0">
+            <a:schemeClr val="accent1"/>
+          </a:effectRef>
+          <a:fontRef idx="minor">
+            <a:schemeClr val="tx1"/>
+          </a:fontRef>
+        </p:style>
+      </p:cxnSp>
+      <p:cxnSp>
+        <p:nvCxnSpPr>
+          <p:cNvPr id="12" name="Rechte verbindingslijn met pijl 11"/>
+          <p:cNvCxnSpPr>
+            <a:stCxn id="18" idx="0"/>
+          </p:cNvCxnSpPr>
+          <p:nvPr/>
+        </p:nvCxnSpPr>
+        <p:spPr>
+          <a:xfrm flipV="1">
+            <a:off x="7834126" y="5285528"/>
+            <a:ext cx="0" cy="375720"/>
+          </a:xfrm>
+          <a:prstGeom prst="straightConnector1">
+            <a:avLst/>
+          </a:prstGeom>
+          <a:ln>
+            <a:tailEnd type="arrow"/>
+          </a:ln>
+        </p:spPr>
+        <p:style>
+          <a:lnRef idx="1">
+            <a:schemeClr val="accent1"/>
+          </a:lnRef>
+          <a:fillRef idx="0">
+            <a:schemeClr val="accent1"/>
+          </a:fillRef>
+          <a:effectRef idx="0">
+            <a:schemeClr val="accent1"/>
+          </a:effectRef>
+          <a:fontRef idx="minor">
+            <a:schemeClr val="tx1"/>
+          </a:fontRef>
+        </p:style>
+      </p:cxnSp>
+      <p:sp>
+        <p:nvSpPr>
+          <p:cNvPr id="23" name="Rechthoek 22"/>
+          <p:cNvSpPr/>
+          <p:nvPr/>
+        </p:nvSpPr>
+        <p:spPr>
+          <a:xfrm>
+            <a:off x="4355976" y="5641834"/>
+            <a:ext cx="1152128" cy="914400"/>
+          </a:xfrm>
+          <a:prstGeom prst="rect">
+            <a:avLst/>
+          </a:prstGeom>
+        </p:spPr>
+        <p:style>
+          <a:lnRef idx="2">
+            <a:schemeClr val="accent1">
+              <a:shade val="50000"/>
+            </a:schemeClr>
+          </a:lnRef>
+          <a:fillRef idx="1">
+            <a:schemeClr val="accent1"/>
+          </a:fillRef>
+          <a:effectRef idx="0">
+            <a:schemeClr val="accent1"/>
+          </a:effectRef>
+          <a:fontRef idx="minor">
+            <a:schemeClr val="lt1"/>
+          </a:fontRef>
+        </p:style>
+        <p:txBody>
+          <a:bodyPr rtlCol="0" anchor="ctr"/>
+          <a:lstStyle/>
+          <a:p>
+            <a:pPr algn="ctr"/>
+            <a:r>
+              <a:rPr lang="nl-NL" dirty="0" smtClean="0"/>
+              <a:t>32 Digit Display Controller </a:t>
+            </a:r>
+            <a:endParaRPr lang="nl-NL" dirty="0"/>
+          </a:p>
+        </p:txBody>
+      </p:sp>
+      <p:cxnSp>
+        <p:nvCxnSpPr>
+          <p:cNvPr id="20" name="Rechte verbindingslijn met pijl 19"/>
+          <p:cNvCxnSpPr>
+            <a:endCxn id="23" idx="0"/>
+          </p:cNvCxnSpPr>
+          <p:nvPr/>
+        </p:nvCxnSpPr>
+        <p:spPr>
+          <a:xfrm>
+            <a:off x="4932040" y="5285528"/>
+            <a:ext cx="0" cy="356306"/>
+          </a:xfrm>
+          <a:prstGeom prst="straightConnector1">
+            <a:avLst/>
+          </a:prstGeom>
+          <a:ln>
+            <a:tailEnd type="arrow"/>
+          </a:ln>
+        </p:spPr>
+        <p:style>
+          <a:lnRef idx="1">
+            <a:schemeClr val="accent1"/>
+          </a:lnRef>
+          <a:fillRef idx="0">
+            <a:schemeClr val="accent1"/>
+          </a:fillRef>
+          <a:effectRef idx="0">
+            <a:schemeClr val="accent1"/>
+          </a:effectRef>
+          <a:fontRef idx="minor">
+            <a:schemeClr val="tx1"/>
+          </a:fontRef>
+        </p:style>
+      </p:cxnSp>
+      <p:sp>
+        <p:nvSpPr>
+          <p:cNvPr id="27" name="Rechthoek 26"/>
+          <p:cNvSpPr/>
+          <p:nvPr/>
+        </p:nvSpPr>
+        <p:spPr>
+          <a:xfrm>
+            <a:off x="2505988" y="5641834"/>
+            <a:ext cx="1260140" cy="914400"/>
+          </a:xfrm>
+          <a:prstGeom prst="rect">
+            <a:avLst/>
+          </a:prstGeom>
+        </p:spPr>
+        <p:style>
+          <a:lnRef idx="2">
+            <a:schemeClr val="accent1">
+              <a:shade val="50000"/>
+            </a:schemeClr>
+          </a:lnRef>
+          <a:fillRef idx="1">
+            <a:schemeClr val="accent1"/>
+          </a:fillRef>
+          <a:effectRef idx="0">
+            <a:schemeClr val="accent1"/>
+          </a:effectRef>
+          <a:fontRef idx="minor">
+            <a:schemeClr val="lt1"/>
+          </a:fontRef>
+        </p:style>
+        <p:txBody>
+          <a:bodyPr rtlCol="0" anchor="ctr"/>
+          <a:lstStyle/>
+          <a:p>
+            <a:pPr algn="ctr"/>
+            <a:r>
+              <a:rPr lang="nl-NL" dirty="0" smtClean="0"/>
+              <a:t>32 Point Output Module </a:t>
+            </a:r>
+            <a:endParaRPr lang="nl-NL" dirty="0"/>
+          </a:p>
+        </p:txBody>
+      </p:sp>
+      <p:cxnSp>
+        <p:nvCxnSpPr>
+          <p:cNvPr id="25" name="Rechte verbindingslijn met pijl 24"/>
+          <p:cNvCxnSpPr>
+            <a:endCxn id="27" idx="0"/>
+          </p:cNvCxnSpPr>
+          <p:nvPr/>
+        </p:nvCxnSpPr>
+        <p:spPr>
+          <a:xfrm>
+            <a:off x="3136058" y="5285528"/>
+            <a:ext cx="0" cy="356306"/>
+          </a:xfrm>
+          <a:prstGeom prst="straightConnector1">
+            <a:avLst/>
+          </a:prstGeom>
+          <a:ln>
+            <a:tailEnd type="arrow"/>
+          </a:ln>
+        </p:spPr>
+        <p:style>
+          <a:lnRef idx="1">
+            <a:schemeClr val="accent1"/>
+          </a:lnRef>
+          <a:fillRef idx="0">
+            <a:schemeClr val="accent1"/>
+          </a:fillRef>
+          <a:effectRef idx="0">
+            <a:schemeClr val="accent1"/>
+          </a:effectRef>
+          <a:fontRef idx="minor">
+            <a:schemeClr val="tx1"/>
+          </a:fontRef>
+        </p:style>
+      </p:cxnSp>
+    </p:spTree>
+    <p:extLst>
+      <p:ext uri="{BB962C8B-B14F-4D97-AF65-F5344CB8AC3E}">
+        <p14:creationId xmlns:p14="http://schemas.microsoft.com/office/powerpoint/2010/main" val="1130628115"/>
+      </p:ext>
+    </p:extLst>
+  </p:cSld>
+  <p:clrMapOvr>
+    <a:masterClrMapping/>
+  </p:clrMapOvr>
+</p:sld>
+</file>
+
+<file path=ppt/slides/slide5.xml><?xml version="1.0" encoding="utf-8"?>
+<p:sld xmlns:a="http://schemas.openxmlformats.org/drawingml/2006/main" xmlns:r="http://schemas.openxmlformats.org/officeDocument/2006/relationships" xmlns:p="http://schemas.openxmlformats.org/presentationml/2006/main">
+  <p:cSld>
+    <p:spTree>
+      <p:nvGrpSpPr>
+        <p:cNvPr id="1" name=""/>
+        <p:cNvGrpSpPr/>
+        <p:nvPr/>
+      </p:nvGrpSpPr>
+      <p:grpSpPr>
+        <a:xfrm>
+          <a:off x="0" y="0"/>
+          <a:ext cx="0" cy="0"/>
+          <a:chOff x="0" y="0"/>
+          <a:chExt cx="0" cy="0"/>
+        </a:xfrm>
+      </p:grpSpPr>
+      <p:sp>
+        <p:nvSpPr>
+          <p:cNvPr id="2" name="Titel 1"/>
+          <p:cNvSpPr>
+            <a:spLocks noGrp="1"/>
+          </p:cNvSpPr>
+          <p:nvPr>
+            <p:ph type="title"/>
+          </p:nvPr>
+        </p:nvSpPr>
+        <p:spPr/>
+        <p:txBody>
+          <a:bodyPr/>
+          <a:lstStyle/>
+          <a:p>
+            <a:r>
+              <a:rPr lang="nl-NL" dirty="0" smtClean="0"/>
+              <a:t>EPIC Hardware</a:t>
+            </a:r>
+            <a:endParaRPr lang="nl-NL" dirty="0"/>
+          </a:p>
+        </p:txBody>
+      </p:sp>
+      <p:sp>
+        <p:nvSpPr>
+          <p:cNvPr id="4" name="Rechthoek 3"/>
+          <p:cNvSpPr/>
+          <p:nvPr/>
+        </p:nvSpPr>
+        <p:spPr>
+          <a:xfrm>
+            <a:off x="287524" y="2852936"/>
+            <a:ext cx="1944216" cy="914400"/>
+          </a:xfrm>
+          <a:prstGeom prst="rect">
+            <a:avLst/>
+          </a:prstGeom>
+        </p:spPr>
+        <p:style>
+          <a:lnRef idx="2">
+            <a:schemeClr val="accent1">
+              <a:shade val="50000"/>
+            </a:schemeClr>
+          </a:lnRef>
+          <a:fillRef idx="1">
+            <a:schemeClr val="accent1"/>
+          </a:fillRef>
+          <a:effectRef idx="0">
+            <a:schemeClr val="accent1"/>
+          </a:effectRef>
+          <a:fontRef idx="minor">
+            <a:schemeClr val="lt1"/>
+          </a:fontRef>
+        </p:style>
+        <p:txBody>
+          <a:bodyPr rtlCol="0" anchor="ctr"/>
+          <a:lstStyle/>
+          <a:p>
+            <a:pPr algn="ctr"/>
+            <a:r>
+              <a:rPr lang="nl-NL" dirty="0" smtClean="0"/>
+              <a:t>Rotary Module </a:t>
+            </a:r>
+            <a:endParaRPr lang="nl-NL" dirty="0"/>
+          </a:p>
+        </p:txBody>
+      </p:sp>
+      <p:sp>
+        <p:nvSpPr>
+          <p:cNvPr id="5" name="Rechthoek 4"/>
+          <p:cNvSpPr/>
+          <p:nvPr/>
+        </p:nvSpPr>
+        <p:spPr>
+          <a:xfrm>
+            <a:off x="262311" y="1628800"/>
+            <a:ext cx="1944216" cy="914400"/>
+          </a:xfrm>
+          <a:prstGeom prst="rect">
+            <a:avLst/>
+          </a:prstGeom>
+        </p:spPr>
+        <p:style>
+          <a:lnRef idx="2">
+            <a:schemeClr val="accent1">
+              <a:shade val="50000"/>
+            </a:schemeClr>
+          </a:lnRef>
+          <a:fillRef idx="1">
+            <a:schemeClr val="accent1"/>
+          </a:fillRef>
+          <a:effectRef idx="0">
+            <a:schemeClr val="accent1"/>
+          </a:effectRef>
+          <a:fontRef idx="minor">
+            <a:schemeClr val="lt1"/>
+          </a:fontRef>
+        </p:style>
+        <p:txBody>
+          <a:bodyPr rtlCol="0" anchor="ctr"/>
+          <a:lstStyle/>
+          <a:p>
+            <a:pPr algn="ctr"/>
+            <a:r>
+              <a:rPr lang="nl-NL" smtClean="0"/>
+              <a:t>64BTN Module</a:t>
+            </a:r>
+            <a:endParaRPr lang="nl-NL" dirty="0"/>
+          </a:p>
+        </p:txBody>
+      </p:sp>
+      <p:sp>
+        <p:nvSpPr>
+          <p:cNvPr id="6" name="Rechthoek 5"/>
+          <p:cNvSpPr/>
+          <p:nvPr/>
+        </p:nvSpPr>
+        <p:spPr>
+          <a:xfrm>
+            <a:off x="287524" y="4149080"/>
+            <a:ext cx="1944216" cy="914400"/>
+          </a:xfrm>
+          <a:prstGeom prst="rect">
+            <a:avLst/>
+          </a:prstGeom>
+        </p:spPr>
+        <p:style>
+          <a:lnRef idx="2">
+            <a:schemeClr val="accent1">
+              <a:shade val="50000"/>
+            </a:schemeClr>
+          </a:lnRef>
+          <a:fillRef idx="1">
+            <a:schemeClr val="accent1"/>
+          </a:fillRef>
+          <a:effectRef idx="0">
+            <a:schemeClr val="accent1"/>
+          </a:effectRef>
+          <a:fontRef idx="minor">
+            <a:schemeClr val="lt1"/>
+          </a:fontRef>
+        </p:style>
+        <p:txBody>
+          <a:bodyPr rtlCol="0" anchor="ctr"/>
+          <a:lstStyle/>
+          <a:p>
+            <a:pPr algn="ctr"/>
+            <a:r>
+              <a:rPr lang="nl-NL" dirty="0" smtClean="0"/>
+              <a:t>32 Digit Display Controller </a:t>
+            </a:r>
+            <a:endParaRPr lang="nl-NL" dirty="0"/>
+          </a:p>
+        </p:txBody>
+      </p:sp>
+      <p:sp>
+        <p:nvSpPr>
+          <p:cNvPr id="7" name="Rechthoek 6"/>
+          <p:cNvSpPr/>
+          <p:nvPr/>
+        </p:nvSpPr>
+        <p:spPr>
+          <a:xfrm>
+            <a:off x="287524" y="5517232"/>
+            <a:ext cx="1944216" cy="914400"/>
+          </a:xfrm>
+          <a:prstGeom prst="rect">
+            <a:avLst/>
+          </a:prstGeom>
+        </p:spPr>
+        <p:style>
+          <a:lnRef idx="2">
+            <a:schemeClr val="accent1">
+              <a:shade val="50000"/>
+            </a:schemeClr>
+          </a:lnRef>
+          <a:fillRef idx="1">
+            <a:schemeClr val="accent1"/>
+          </a:fillRef>
+          <a:effectRef idx="0">
+            <a:schemeClr val="accent1"/>
+          </a:effectRef>
+          <a:fontRef idx="minor">
+            <a:schemeClr val="lt1"/>
+          </a:fontRef>
+        </p:style>
+        <p:txBody>
+          <a:bodyPr rtlCol="0" anchor="ctr"/>
+          <a:lstStyle/>
+          <a:p>
+            <a:pPr algn="ctr"/>
+            <a:r>
+              <a:rPr lang="nl-NL" dirty="0" smtClean="0"/>
+              <a:t>32 Point Output Module </a:t>
+            </a:r>
+            <a:endParaRPr lang="nl-NL" dirty="0"/>
+          </a:p>
+        </p:txBody>
+      </p:sp>
+      <p:sp>
+        <p:nvSpPr>
+          <p:cNvPr id="8" name="Rechthoek 7"/>
+          <p:cNvSpPr/>
+          <p:nvPr/>
+        </p:nvSpPr>
+        <p:spPr>
+          <a:xfrm>
+            <a:off x="2339752" y="1637806"/>
+            <a:ext cx="2887457" cy="338554"/>
+          </a:xfrm>
+          <a:prstGeom prst="rect">
+            <a:avLst/>
+          </a:prstGeom>
+        </p:spPr>
+        <p:txBody>
+          <a:bodyPr wrap="none">
+            <a:spAutoFit/>
+          </a:bodyPr>
+          <a:lstStyle/>
+          <a:p>
+            <a:r>
+              <a:rPr lang="nl-NL" sz="1600" dirty="0" err="1" smtClean="0"/>
+              <a:t>definemodule</a:t>
+            </a:r>
+            <a:r>
+              <a:rPr lang="nl-NL" sz="1600" dirty="0" smtClean="0"/>
+              <a:t>(1,SLOWSCAN,0,8)</a:t>
+            </a:r>
+            <a:endParaRPr lang="nl-NL" sz="1600" dirty="0"/>
+          </a:p>
+        </p:txBody>
+      </p:sp>
+      <p:sp>
+        <p:nvSpPr>
+          <p:cNvPr id="9" name="Rechthoek 8"/>
+          <p:cNvSpPr/>
+          <p:nvPr/>
+        </p:nvSpPr>
+        <p:spPr>
+          <a:xfrm>
+            <a:off x="2339752" y="2852936"/>
+            <a:ext cx="2788199" cy="338554"/>
+          </a:xfrm>
+          <a:prstGeom prst="rect">
+            <a:avLst/>
+          </a:prstGeom>
+        </p:spPr>
+        <p:txBody>
+          <a:bodyPr wrap="none">
+            <a:spAutoFit/>
+          </a:bodyPr>
+          <a:lstStyle/>
+          <a:p>
+            <a:r>
+              <a:rPr lang="nl-NL" sz="1600" dirty="0" err="1" smtClean="0"/>
+              <a:t>definemodule</a:t>
+            </a:r>
+            <a:r>
+              <a:rPr lang="nl-NL" sz="1600" dirty="0" smtClean="0"/>
+              <a:t>(7,FASTSCAN,0,4)</a:t>
+            </a:r>
+            <a:endParaRPr lang="nl-NL" sz="1600" dirty="0"/>
+          </a:p>
+        </p:txBody>
+      </p:sp>
+      <p:sp>
+        <p:nvSpPr>
+          <p:cNvPr id="10" name="Rechthoek 9"/>
+          <p:cNvSpPr/>
+          <p:nvPr/>
+        </p:nvSpPr>
+        <p:spPr>
+          <a:xfrm>
+            <a:off x="2339752" y="2007138"/>
+            <a:ext cx="6357574" cy="338554"/>
+          </a:xfrm>
+          <a:prstGeom prst="rect">
+            <a:avLst/>
+          </a:prstGeom>
+        </p:spPr>
+        <p:txBody>
+          <a:bodyPr wrap="none">
+            <a:spAutoFit/>
+          </a:bodyPr>
+          <a:lstStyle/>
+          <a:p>
+            <a:r>
+              <a:rPr lang="en-US" sz="1600" dirty="0"/>
+              <a:t>J1 connected to J4 on module ABA =&gt; Epic inputs M1/R0/B0 to M1/R7/B7 </a:t>
+            </a:r>
+            <a:endParaRPr lang="nl-NL" sz="1600" dirty="0"/>
+          </a:p>
+        </p:txBody>
+      </p:sp>
+    </p:spTree>
+    <p:extLst>
+      <p:ext uri="{BB962C8B-B14F-4D97-AF65-F5344CB8AC3E}">
+        <p14:creationId xmlns:p14="http://schemas.microsoft.com/office/powerpoint/2010/main" val="1205371784"/>
+      </p:ext>
+    </p:extLst>
+  </p:cSld>
+  <p:clrMapOvr>
+    <a:masterClrMapping/>
+  </p:clrMapOvr>
+</p:sld>
+</file>
+
+<file path=ppt/slides/slide6.xml><?xml version="1.0" encoding="utf-8"?>
+<p:sld xmlns:a="http://schemas.openxmlformats.org/drawingml/2006/main" xmlns:r="http://schemas.openxmlformats.org/officeDocument/2006/relationships" xmlns:p="http://schemas.openxmlformats.org/presentationml/2006/main">
+  <p:cSld>
+    <p:spTree>
+      <p:nvGrpSpPr>
+        <p:cNvPr id="1" name=""/>
+        <p:cNvGrpSpPr/>
+        <p:nvPr/>
+      </p:nvGrpSpPr>
+      <p:grpSpPr>
+        <a:xfrm>
+          <a:off x="0" y="0"/>
+          <a:ext cx="0" cy="0"/>
+          <a:chOff x="0" y="0"/>
+          <a:chExt cx="0" cy="0"/>
+        </a:xfrm>
+      </p:grpSpPr>
+      <p:sp>
+        <p:nvSpPr>
+          <p:cNvPr id="2" name="Titel 1"/>
+          <p:cNvSpPr>
+            <a:spLocks noGrp="1"/>
+          </p:cNvSpPr>
+          <p:nvPr>
+            <p:ph type="title"/>
+          </p:nvPr>
+        </p:nvSpPr>
+        <p:spPr/>
+        <p:txBody>
+          <a:bodyPr/>
+          <a:lstStyle/>
+          <a:p>
+            <a:r>
+              <a:rPr lang="nl-NL" dirty="0" smtClean="0"/>
+              <a:t>MCP Hardware</a:t>
+            </a:r>
+            <a:endParaRPr lang="nl-NL" dirty="0"/>
+          </a:p>
+        </p:txBody>
+      </p:sp>
+      <p:sp>
+        <p:nvSpPr>
+          <p:cNvPr id="4" name="Rechthoek 3"/>
+          <p:cNvSpPr/>
+          <p:nvPr/>
+        </p:nvSpPr>
+        <p:spPr>
+          <a:xfrm>
+            <a:off x="395536" y="1268760"/>
+            <a:ext cx="6264696" cy="3693319"/>
+          </a:xfrm>
+          <a:prstGeom prst="rect">
+            <a:avLst/>
+          </a:prstGeom>
+        </p:spPr>
+        <p:txBody>
+          <a:bodyPr wrap="square">
+            <a:spAutoFit/>
+          </a:bodyPr>
+          <a:lstStyle/>
+          <a:p>
+            <a:r>
+              <a:rPr lang="nl-NL" dirty="0" err="1" smtClean="0"/>
+              <a:t>led_LNAV</a:t>
+            </a:r>
+            <a:r>
+              <a:rPr lang="nl-NL" dirty="0" smtClean="0"/>
+              <a:t> </a:t>
+            </a:r>
+            <a:r>
+              <a:rPr lang="nl-NL" dirty="0"/>
+              <a:t>= 0x01</a:t>
+            </a:r>
+            <a:r>
+              <a:rPr lang="nl-NL" dirty="0" smtClean="0"/>
+              <a:t>; //</a:t>
+            </a:r>
+            <a:r>
+              <a:rPr lang="nl-NL" dirty="0"/>
+              <a:t>32 Point Output </a:t>
+            </a:r>
+            <a:r>
+              <a:rPr lang="nl-NL" dirty="0" smtClean="0"/>
+              <a:t>Module </a:t>
+            </a:r>
+            <a:r>
+              <a:rPr lang="nl-NL" dirty="0" err="1" smtClean="0"/>
+              <a:t>wire</a:t>
+            </a:r>
+            <a:r>
+              <a:rPr lang="nl-NL" dirty="0" smtClean="0"/>
+              <a:t> #3 </a:t>
+            </a:r>
+            <a:endParaRPr lang="nl-NL" dirty="0"/>
+          </a:p>
+          <a:p>
+            <a:r>
+              <a:rPr lang="nl-NL" dirty="0" err="1" smtClean="0"/>
+              <a:t>led_HDG</a:t>
+            </a:r>
+            <a:r>
+              <a:rPr lang="nl-NL" dirty="0" smtClean="0"/>
+              <a:t> </a:t>
+            </a:r>
+            <a:r>
+              <a:rPr lang="nl-NL" dirty="0"/>
+              <a:t>= 0x02</a:t>
+            </a:r>
+            <a:r>
+              <a:rPr lang="nl-NL" dirty="0" smtClean="0"/>
+              <a:t>; </a:t>
+            </a:r>
+            <a:r>
+              <a:rPr lang="nl-NL" dirty="0"/>
+              <a:t>//32 Point Output Module </a:t>
+            </a:r>
+            <a:r>
+              <a:rPr lang="nl-NL" dirty="0" err="1"/>
+              <a:t>wire</a:t>
+            </a:r>
+            <a:r>
+              <a:rPr lang="nl-NL" dirty="0"/>
+              <a:t> </a:t>
+            </a:r>
+            <a:r>
+              <a:rPr lang="nl-NL" dirty="0" smtClean="0"/>
+              <a:t>#4 </a:t>
+            </a:r>
+            <a:endParaRPr lang="nl-NL" dirty="0"/>
+          </a:p>
+          <a:p>
+            <a:r>
+              <a:rPr lang="nl-NL" dirty="0" err="1" smtClean="0"/>
+              <a:t>led_FLCH</a:t>
+            </a:r>
+            <a:r>
+              <a:rPr lang="nl-NL" dirty="0" smtClean="0"/>
+              <a:t> </a:t>
+            </a:r>
+            <a:r>
+              <a:rPr lang="nl-NL" dirty="0"/>
+              <a:t>= 0x04</a:t>
+            </a:r>
+            <a:r>
+              <a:rPr lang="nl-NL" dirty="0" smtClean="0"/>
+              <a:t>; </a:t>
+            </a:r>
+            <a:r>
+              <a:rPr lang="nl-NL" dirty="0"/>
+              <a:t>//32 Point Output Module </a:t>
+            </a:r>
+            <a:r>
+              <a:rPr lang="nl-NL" dirty="0" err="1"/>
+              <a:t>wire</a:t>
+            </a:r>
+            <a:r>
+              <a:rPr lang="nl-NL" dirty="0"/>
+              <a:t> </a:t>
+            </a:r>
+            <a:r>
+              <a:rPr lang="nl-NL" dirty="0" smtClean="0"/>
+              <a:t>#5 </a:t>
+            </a:r>
+            <a:endParaRPr lang="nl-NL" dirty="0"/>
+          </a:p>
+          <a:p>
+            <a:r>
+              <a:rPr lang="nl-NL" dirty="0" err="1" smtClean="0"/>
+              <a:t>led_VNAV</a:t>
+            </a:r>
+            <a:r>
+              <a:rPr lang="nl-NL" dirty="0" smtClean="0"/>
+              <a:t> </a:t>
+            </a:r>
+            <a:r>
+              <a:rPr lang="nl-NL" dirty="0"/>
+              <a:t>= 0x08</a:t>
+            </a:r>
+            <a:r>
+              <a:rPr lang="nl-NL" dirty="0" smtClean="0"/>
+              <a:t>; </a:t>
+            </a:r>
+            <a:r>
+              <a:rPr lang="nl-NL" dirty="0"/>
+              <a:t>//32 Point Output Module </a:t>
+            </a:r>
+            <a:r>
+              <a:rPr lang="nl-NL" dirty="0" err="1"/>
+              <a:t>wire</a:t>
+            </a:r>
+            <a:r>
+              <a:rPr lang="nl-NL" dirty="0"/>
+              <a:t> </a:t>
+            </a:r>
+            <a:r>
+              <a:rPr lang="nl-NL" dirty="0" smtClean="0"/>
+              <a:t>#6 </a:t>
+            </a:r>
+            <a:endParaRPr lang="nl-NL" dirty="0"/>
+          </a:p>
+          <a:p>
+            <a:r>
+              <a:rPr lang="nl-NL" dirty="0" err="1" smtClean="0"/>
+              <a:t>led_SPD</a:t>
+            </a:r>
+            <a:r>
+              <a:rPr lang="nl-NL" dirty="0" smtClean="0"/>
+              <a:t> </a:t>
+            </a:r>
+            <a:r>
+              <a:rPr lang="nl-NL" dirty="0"/>
+              <a:t>= 0x10</a:t>
+            </a:r>
+            <a:r>
+              <a:rPr lang="nl-NL" dirty="0" smtClean="0"/>
+              <a:t>; </a:t>
+            </a:r>
+            <a:r>
+              <a:rPr lang="nl-NL" dirty="0"/>
+              <a:t>//32 Point Output Module </a:t>
+            </a:r>
+            <a:r>
+              <a:rPr lang="nl-NL" dirty="0" err="1"/>
+              <a:t>wire</a:t>
+            </a:r>
+            <a:r>
+              <a:rPr lang="nl-NL" dirty="0"/>
+              <a:t> </a:t>
+            </a:r>
+            <a:r>
+              <a:rPr lang="nl-NL" dirty="0" smtClean="0"/>
+              <a:t>#</a:t>
+            </a:r>
+            <a:r>
+              <a:rPr lang="nl-NL" dirty="0"/>
+              <a:t>7</a:t>
+            </a:r>
+          </a:p>
+          <a:p>
+            <a:r>
+              <a:rPr lang="nl-NL" dirty="0" err="1" smtClean="0"/>
+              <a:t>led_THR</a:t>
+            </a:r>
+            <a:r>
+              <a:rPr lang="nl-NL" dirty="0" smtClean="0"/>
+              <a:t> </a:t>
+            </a:r>
+            <a:r>
+              <a:rPr lang="nl-NL" dirty="0"/>
+              <a:t>= 0x20</a:t>
+            </a:r>
+            <a:r>
+              <a:rPr lang="nl-NL" dirty="0" smtClean="0"/>
+              <a:t>; </a:t>
+            </a:r>
+            <a:r>
+              <a:rPr lang="nl-NL" dirty="0"/>
+              <a:t>//32 Point Output Module </a:t>
+            </a:r>
+            <a:r>
+              <a:rPr lang="nl-NL" dirty="0" err="1"/>
+              <a:t>wire</a:t>
+            </a:r>
+            <a:r>
+              <a:rPr lang="nl-NL" dirty="0"/>
+              <a:t> </a:t>
+            </a:r>
+            <a:r>
+              <a:rPr lang="nl-NL" dirty="0" smtClean="0"/>
+              <a:t>#8 </a:t>
+            </a:r>
+            <a:endParaRPr lang="nl-NL" dirty="0"/>
+          </a:p>
+          <a:p>
+            <a:r>
+              <a:rPr lang="nl-NL" dirty="0" err="1" smtClean="0"/>
+              <a:t>led_ALT</a:t>
+            </a:r>
+            <a:r>
+              <a:rPr lang="nl-NL" dirty="0" smtClean="0"/>
+              <a:t> </a:t>
+            </a:r>
+            <a:r>
+              <a:rPr lang="nl-NL" dirty="0"/>
+              <a:t>= 0x40</a:t>
+            </a:r>
+            <a:r>
+              <a:rPr lang="nl-NL" dirty="0" smtClean="0"/>
+              <a:t>; </a:t>
+            </a:r>
+            <a:r>
+              <a:rPr lang="nl-NL" dirty="0"/>
+              <a:t>//32 Point Output Module </a:t>
+            </a:r>
+            <a:r>
+              <a:rPr lang="nl-NL" dirty="0" err="1"/>
+              <a:t>wire</a:t>
+            </a:r>
+            <a:r>
+              <a:rPr lang="nl-NL" dirty="0"/>
+              <a:t> </a:t>
+            </a:r>
+            <a:r>
+              <a:rPr lang="nl-NL" dirty="0" smtClean="0"/>
+              <a:t>#</a:t>
+            </a:r>
+            <a:r>
+              <a:rPr lang="nl-NL" dirty="0"/>
+              <a:t>9</a:t>
+            </a:r>
+          </a:p>
+          <a:p>
+            <a:r>
+              <a:rPr lang="nl-NL" dirty="0" err="1" smtClean="0"/>
+              <a:t>led_VS</a:t>
+            </a:r>
+            <a:r>
+              <a:rPr lang="nl-NL" dirty="0" smtClean="0"/>
+              <a:t> </a:t>
+            </a:r>
+            <a:r>
+              <a:rPr lang="nl-NL" dirty="0"/>
+              <a:t>= 0x80</a:t>
+            </a:r>
+            <a:r>
+              <a:rPr lang="nl-NL" dirty="0" smtClean="0"/>
+              <a:t>; </a:t>
+            </a:r>
+            <a:r>
+              <a:rPr lang="nl-NL" dirty="0"/>
+              <a:t>//32 Point Output Module </a:t>
+            </a:r>
+            <a:r>
+              <a:rPr lang="nl-NL" dirty="0" err="1"/>
+              <a:t>wire</a:t>
+            </a:r>
+            <a:r>
+              <a:rPr lang="nl-NL" dirty="0"/>
+              <a:t> </a:t>
+            </a:r>
+            <a:r>
+              <a:rPr lang="nl-NL" dirty="0" smtClean="0"/>
+              <a:t>#10</a:t>
+            </a:r>
+            <a:endParaRPr lang="nl-NL" dirty="0"/>
+          </a:p>
+          <a:p>
+            <a:r>
+              <a:rPr lang="nl-NL" dirty="0" err="1" smtClean="0"/>
+              <a:t>led_LOC</a:t>
+            </a:r>
+            <a:r>
+              <a:rPr lang="nl-NL" dirty="0" smtClean="0"/>
+              <a:t> </a:t>
+            </a:r>
+            <a:r>
+              <a:rPr lang="nl-NL" dirty="0"/>
+              <a:t>= 0x01</a:t>
+            </a:r>
+            <a:r>
+              <a:rPr lang="nl-NL" dirty="0" smtClean="0"/>
+              <a:t>; </a:t>
+            </a:r>
+            <a:r>
+              <a:rPr lang="nl-NL" dirty="0"/>
+              <a:t>//32 Point Output Module </a:t>
+            </a:r>
+            <a:r>
+              <a:rPr lang="nl-NL" dirty="0" err="1"/>
+              <a:t>wire</a:t>
+            </a:r>
+            <a:r>
+              <a:rPr lang="nl-NL" dirty="0"/>
+              <a:t> </a:t>
+            </a:r>
+            <a:r>
+              <a:rPr lang="nl-NL" dirty="0" smtClean="0"/>
+              <a:t>#11 </a:t>
+            </a:r>
+            <a:endParaRPr lang="nl-NL" dirty="0"/>
+          </a:p>
+          <a:p>
+            <a:r>
+              <a:rPr lang="nl-NL" dirty="0" err="1" smtClean="0"/>
+              <a:t>led_APPR</a:t>
+            </a:r>
+            <a:r>
+              <a:rPr lang="nl-NL" dirty="0" smtClean="0"/>
+              <a:t> </a:t>
+            </a:r>
+            <a:r>
+              <a:rPr lang="nl-NL" dirty="0"/>
+              <a:t>= 0x02</a:t>
+            </a:r>
+            <a:r>
+              <a:rPr lang="nl-NL" dirty="0" smtClean="0"/>
+              <a:t>; </a:t>
+            </a:r>
+            <a:r>
+              <a:rPr lang="nl-NL" dirty="0"/>
+              <a:t>//32 Point Output Module </a:t>
+            </a:r>
+            <a:r>
+              <a:rPr lang="nl-NL" dirty="0" err="1"/>
+              <a:t>wire</a:t>
+            </a:r>
+            <a:r>
+              <a:rPr lang="nl-NL" dirty="0"/>
+              <a:t> </a:t>
+            </a:r>
+            <a:r>
+              <a:rPr lang="nl-NL" dirty="0" smtClean="0"/>
+              <a:t>#12 </a:t>
+            </a:r>
+            <a:endParaRPr lang="nl-NL" dirty="0"/>
+          </a:p>
+          <a:p>
+            <a:r>
+              <a:rPr lang="nl-NL" dirty="0" smtClean="0"/>
+              <a:t>led_AP2 </a:t>
+            </a:r>
+            <a:r>
+              <a:rPr lang="nl-NL" dirty="0"/>
+              <a:t>= 0x04</a:t>
+            </a:r>
+            <a:r>
+              <a:rPr lang="nl-NL" dirty="0" smtClean="0"/>
+              <a:t>; </a:t>
+            </a:r>
+            <a:r>
+              <a:rPr lang="nl-NL" dirty="0"/>
+              <a:t>//32 Point Output Module </a:t>
+            </a:r>
+            <a:r>
+              <a:rPr lang="nl-NL" dirty="0" err="1"/>
+              <a:t>wire</a:t>
+            </a:r>
+            <a:r>
+              <a:rPr lang="nl-NL" dirty="0"/>
+              <a:t> </a:t>
+            </a:r>
+            <a:r>
+              <a:rPr lang="nl-NL" dirty="0" smtClean="0"/>
+              <a:t>#13 </a:t>
+            </a:r>
+            <a:endParaRPr lang="nl-NL" dirty="0"/>
+          </a:p>
+          <a:p>
+            <a:r>
+              <a:rPr lang="nl-NL" dirty="0" smtClean="0"/>
+              <a:t>led_AP1 </a:t>
+            </a:r>
+            <a:r>
+              <a:rPr lang="nl-NL" dirty="0"/>
+              <a:t>= 0x08</a:t>
+            </a:r>
+            <a:r>
+              <a:rPr lang="nl-NL" dirty="0" smtClean="0"/>
+              <a:t>; </a:t>
+            </a:r>
+            <a:r>
+              <a:rPr lang="nl-NL" dirty="0"/>
+              <a:t>//32 Point Output Module </a:t>
+            </a:r>
+            <a:r>
+              <a:rPr lang="nl-NL" dirty="0" err="1"/>
+              <a:t>wire</a:t>
+            </a:r>
+            <a:r>
+              <a:rPr lang="nl-NL" dirty="0"/>
+              <a:t> </a:t>
+            </a:r>
+            <a:r>
+              <a:rPr lang="nl-NL" dirty="0" smtClean="0"/>
+              <a:t>#14</a:t>
+            </a:r>
+            <a:endParaRPr lang="nl-NL" dirty="0"/>
+          </a:p>
+          <a:p>
+            <a:r>
+              <a:rPr lang="nl-NL" dirty="0" smtClean="0"/>
+              <a:t>led_AP3 </a:t>
+            </a:r>
+            <a:r>
+              <a:rPr lang="nl-NL" dirty="0"/>
+              <a:t>= 0x20</a:t>
+            </a:r>
+            <a:r>
+              <a:rPr lang="nl-NL" dirty="0" smtClean="0"/>
+              <a:t>; </a:t>
+            </a:r>
+            <a:r>
+              <a:rPr lang="nl-NL" dirty="0"/>
+              <a:t>//32 Point Output Module </a:t>
+            </a:r>
+            <a:r>
+              <a:rPr lang="nl-NL" dirty="0" err="1"/>
+              <a:t>wire</a:t>
+            </a:r>
+            <a:r>
+              <a:rPr lang="nl-NL"/>
+              <a:t> </a:t>
+            </a:r>
+            <a:r>
+              <a:rPr lang="nl-NL" smtClean="0"/>
+              <a:t>#16 </a:t>
+            </a:r>
+            <a:endParaRPr lang="nl-NL" dirty="0"/>
+          </a:p>
+        </p:txBody>
+      </p:sp>
+    </p:spTree>
+    <p:extLst>
+      <p:ext uri="{BB962C8B-B14F-4D97-AF65-F5344CB8AC3E}">
+        <p14:creationId xmlns:p14="http://schemas.microsoft.com/office/powerpoint/2010/main" val="1474203528"/>
       </p:ext>
     </p:extLst>
   </p:cSld>

</xml_diff>

<commit_message>
Code optimized and MCP leds checked
</commit_message>
<xml_diff>
--- a/747-400 EPIC.pptx
+++ b/747-400 EPIC.pptx
@@ -10,7 +10,11 @@
     <p:sldId id="258" r:id="rId4"/>
     <p:sldId id="260" r:id="rId5"/>
     <p:sldId id="259" r:id="rId6"/>
-    <p:sldId id="261" r:id="rId7"/>
+    <p:sldId id="263" r:id="rId7"/>
+    <p:sldId id="261" r:id="rId8"/>
+    <p:sldId id="262" r:id="rId9"/>
+    <p:sldId id="264" r:id="rId10"/>
+    <p:sldId id="265" r:id="rId11"/>
   </p:sldIdLst>
   <p:sldSz cx="9144000" cy="6858000" type="screen4x3"/>
   <p:notesSz cx="6858000" cy="9144000"/>
@@ -293,7 +297,7 @@
           <a:p>
             <a:fld id="{0CAA59F2-031C-4F37-8DD9-C9C8B7A122A4}" type="datetimeFigureOut">
               <a:rPr lang="nl-NL" smtClean="0"/>
-              <a:t>17-8-2013</a:t>
+              <a:t>18-8-2013</a:t>
             </a:fld>
             <a:endParaRPr lang="nl-NL"/>
           </a:p>
@@ -463,7 +467,7 @@
           <a:p>
             <a:fld id="{0CAA59F2-031C-4F37-8DD9-C9C8B7A122A4}" type="datetimeFigureOut">
               <a:rPr lang="nl-NL" smtClean="0"/>
-              <a:t>17-8-2013</a:t>
+              <a:t>18-8-2013</a:t>
             </a:fld>
             <a:endParaRPr lang="nl-NL"/>
           </a:p>
@@ -643,7 +647,7 @@
           <a:p>
             <a:fld id="{0CAA59F2-031C-4F37-8DD9-C9C8B7A122A4}" type="datetimeFigureOut">
               <a:rPr lang="nl-NL" smtClean="0"/>
-              <a:t>17-8-2013</a:t>
+              <a:t>18-8-2013</a:t>
             </a:fld>
             <a:endParaRPr lang="nl-NL"/>
           </a:p>
@@ -813,7 +817,7 @@
           <a:p>
             <a:fld id="{0CAA59F2-031C-4F37-8DD9-C9C8B7A122A4}" type="datetimeFigureOut">
               <a:rPr lang="nl-NL" smtClean="0"/>
-              <a:t>17-8-2013</a:t>
+              <a:t>18-8-2013</a:t>
             </a:fld>
             <a:endParaRPr lang="nl-NL"/>
           </a:p>
@@ -1059,7 +1063,7 @@
           <a:p>
             <a:fld id="{0CAA59F2-031C-4F37-8DD9-C9C8B7A122A4}" type="datetimeFigureOut">
               <a:rPr lang="nl-NL" smtClean="0"/>
-              <a:t>17-8-2013</a:t>
+              <a:t>18-8-2013</a:t>
             </a:fld>
             <a:endParaRPr lang="nl-NL"/>
           </a:p>
@@ -1347,7 +1351,7 @@
           <a:p>
             <a:fld id="{0CAA59F2-031C-4F37-8DD9-C9C8B7A122A4}" type="datetimeFigureOut">
               <a:rPr lang="nl-NL" smtClean="0"/>
-              <a:t>17-8-2013</a:t>
+              <a:t>18-8-2013</a:t>
             </a:fld>
             <a:endParaRPr lang="nl-NL"/>
           </a:p>
@@ -1769,7 +1773,7 @@
           <a:p>
             <a:fld id="{0CAA59F2-031C-4F37-8DD9-C9C8B7A122A4}" type="datetimeFigureOut">
               <a:rPr lang="nl-NL" smtClean="0"/>
-              <a:t>17-8-2013</a:t>
+              <a:t>18-8-2013</a:t>
             </a:fld>
             <a:endParaRPr lang="nl-NL"/>
           </a:p>
@@ -1887,7 +1891,7 @@
           <a:p>
             <a:fld id="{0CAA59F2-031C-4F37-8DD9-C9C8B7A122A4}" type="datetimeFigureOut">
               <a:rPr lang="nl-NL" smtClean="0"/>
-              <a:t>17-8-2013</a:t>
+              <a:t>18-8-2013</a:t>
             </a:fld>
             <a:endParaRPr lang="nl-NL"/>
           </a:p>
@@ -1982,7 +1986,7 @@
           <a:p>
             <a:fld id="{0CAA59F2-031C-4F37-8DD9-C9C8B7A122A4}" type="datetimeFigureOut">
               <a:rPr lang="nl-NL" smtClean="0"/>
-              <a:t>17-8-2013</a:t>
+              <a:t>18-8-2013</a:t>
             </a:fld>
             <a:endParaRPr lang="nl-NL"/>
           </a:p>
@@ -2259,7 +2263,7 @@
           <a:p>
             <a:fld id="{0CAA59F2-031C-4F37-8DD9-C9C8B7A122A4}" type="datetimeFigureOut">
               <a:rPr lang="nl-NL" smtClean="0"/>
-              <a:t>17-8-2013</a:t>
+              <a:t>18-8-2013</a:t>
             </a:fld>
             <a:endParaRPr lang="nl-NL"/>
           </a:p>
@@ -2512,7 +2516,7 @@
           <a:p>
             <a:fld id="{0CAA59F2-031C-4F37-8DD9-C9C8B7A122A4}" type="datetimeFigureOut">
               <a:rPr lang="nl-NL" smtClean="0"/>
-              <a:t>17-8-2013</a:t>
+              <a:t>18-8-2013</a:t>
             </a:fld>
             <a:endParaRPr lang="nl-NL"/>
           </a:p>
@@ -2725,7 +2729,7 @@
           <a:p>
             <a:fld id="{0CAA59F2-031C-4F37-8DD9-C9C8B7A122A4}" type="datetimeFigureOut">
               <a:rPr lang="nl-NL" smtClean="0"/>
-              <a:t>17-8-2013</a:t>
+              <a:t>18-8-2013</a:t>
             </a:fld>
             <a:endParaRPr lang="nl-NL"/>
           </a:p>
@@ -3171,6 +3175,274 @@
 </p:sld>
 </file>
 
+<file path=ppt/slides/slide10.xml><?xml version="1.0" encoding="utf-8"?>
+<p:sld xmlns:a="http://schemas.openxmlformats.org/drawingml/2006/main" xmlns:r="http://schemas.openxmlformats.org/officeDocument/2006/relationships" xmlns:p="http://schemas.openxmlformats.org/presentationml/2006/main">
+  <p:cSld>
+    <p:spTree>
+      <p:nvGrpSpPr>
+        <p:cNvPr id="1" name=""/>
+        <p:cNvGrpSpPr/>
+        <p:nvPr/>
+      </p:nvGrpSpPr>
+      <p:grpSpPr>
+        <a:xfrm>
+          <a:off x="0" y="0"/>
+          <a:ext cx="0" cy="0"/>
+          <a:chOff x="0" y="0"/>
+          <a:chExt cx="0" cy="0"/>
+        </a:xfrm>
+      </p:grpSpPr>
+      <p:sp>
+        <p:nvSpPr>
+          <p:cNvPr id="2" name="Titel 1"/>
+          <p:cNvSpPr>
+            <a:spLocks noGrp="1"/>
+          </p:cNvSpPr>
+          <p:nvPr>
+            <p:ph type="title"/>
+          </p:nvPr>
+        </p:nvSpPr>
+        <p:spPr/>
+        <p:txBody>
+          <a:bodyPr/>
+          <a:lstStyle/>
+          <a:p>
+            <a:endParaRPr lang="nl-NL"/>
+          </a:p>
+        </p:txBody>
+      </p:sp>
+      <p:sp>
+        <p:nvSpPr>
+          <p:cNvPr id="4" name="Tekstvak 3"/>
+          <p:cNvSpPr txBox="1"/>
+          <p:nvPr/>
+        </p:nvSpPr>
+        <p:spPr>
+          <a:xfrm>
+            <a:off x="4058794" y="1484784"/>
+            <a:ext cx="4824536" cy="5355312"/>
+          </a:xfrm>
+          <a:prstGeom prst="rect">
+            <a:avLst/>
+          </a:prstGeom>
+          <a:noFill/>
+        </p:spPr>
+        <p:txBody>
+          <a:bodyPr wrap="square" rtlCol="0">
+            <a:spAutoFit/>
+          </a:bodyPr>
+          <a:lstStyle/>
+          <a:p>
+            <a:r>
+              <a:rPr lang="nl-NL" b="1" dirty="0" smtClean="0"/>
+              <a:t>FSUIPC</a:t>
+            </a:r>
+          </a:p>
+          <a:p>
+            <a:r>
+              <a:rPr lang="en-GB" dirty="0"/>
+              <a:t>SPDP Bit10 (SPD pushbutton 747 MCP)</a:t>
+            </a:r>
+            <a:br>
+              <a:rPr lang="en-GB" dirty="0"/>
+            </a:br>
+            <a:r>
+              <a:rPr lang="en-GB" dirty="0"/>
+              <a:t>HDGP Bit11 (heading SEL pushbutton 747 MCP)</a:t>
+            </a:r>
+            <a:br>
+              <a:rPr lang="en-GB" dirty="0"/>
+            </a:br>
+            <a:r>
+              <a:rPr lang="en-GB" dirty="0"/>
+              <a:t>ALTP Bit12 (ALT pushbutton 747 MCP)</a:t>
+            </a:r>
+            <a:br>
+              <a:rPr lang="en-GB" dirty="0"/>
+            </a:br>
+            <a:r>
+              <a:rPr lang="en-GB" dirty="0" smtClean="0"/>
+              <a:t>F/D </a:t>
+            </a:r>
+            <a:r>
+              <a:rPr lang="en-GB" dirty="0" err="1"/>
+              <a:t>Copilot</a:t>
+            </a:r>
+            <a:r>
+              <a:rPr lang="en-GB" dirty="0"/>
+              <a:t> On B17</a:t>
+            </a:r>
+            <a:br>
+              <a:rPr lang="en-GB" dirty="0"/>
+            </a:br>
+            <a:r>
+              <a:rPr lang="en-GB" dirty="0"/>
+              <a:t>F/D </a:t>
+            </a:r>
+            <a:r>
+              <a:rPr lang="en-GB" dirty="0" err="1"/>
+              <a:t>Copilot</a:t>
+            </a:r>
+            <a:r>
+              <a:rPr lang="en-GB" dirty="0"/>
+              <a:t> Off B18</a:t>
+            </a:r>
+            <a:br>
+              <a:rPr lang="en-GB" dirty="0"/>
+            </a:br>
+            <a:r>
+              <a:rPr lang="en-GB" dirty="0"/>
+              <a:t>ATON Bit19 (switch on)</a:t>
+            </a:r>
+            <a:br>
+              <a:rPr lang="en-GB" dirty="0"/>
+            </a:br>
+            <a:r>
+              <a:rPr lang="en-GB" dirty="0"/>
+              <a:t>ATFF Bit20 (switch off)</a:t>
+            </a:r>
+            <a:br>
+              <a:rPr lang="en-GB" dirty="0"/>
+            </a:br>
+            <a:r>
+              <a:rPr lang="en-GB" dirty="0"/>
+              <a:t>THR Bit21</a:t>
+            </a:r>
+            <a:br>
+              <a:rPr lang="en-GB" dirty="0"/>
+            </a:br>
+            <a:r>
+              <a:rPr lang="en-GB" dirty="0"/>
+              <a:t>SPD Bit22</a:t>
+            </a:r>
+            <a:br>
+              <a:rPr lang="en-GB" dirty="0"/>
+            </a:br>
+            <a:r>
+              <a:rPr lang="en-GB" dirty="0"/>
+              <a:t>MACH Bit23 (</a:t>
+            </a:r>
+            <a:r>
+              <a:rPr lang="en-GB" dirty="0" err="1"/>
+              <a:t>spd</a:t>
+            </a:r>
+            <a:r>
+              <a:rPr lang="en-GB" dirty="0"/>
+              <a:t>/</a:t>
+            </a:r>
+            <a:r>
+              <a:rPr lang="en-GB" dirty="0" err="1"/>
+              <a:t>mach</a:t>
+            </a:r>
+            <a:r>
+              <a:rPr lang="en-GB" dirty="0"/>
+              <a:t> toggle... C/O, SEL)</a:t>
+            </a:r>
+            <a:br>
+              <a:rPr lang="en-GB" dirty="0"/>
+            </a:br>
+            <a:r>
+              <a:rPr lang="en-GB" dirty="0"/>
+              <a:t>FLCH Bit24</a:t>
+            </a:r>
+            <a:br>
+              <a:rPr lang="en-GB" dirty="0"/>
+            </a:br>
+            <a:r>
+              <a:rPr lang="en-GB" dirty="0"/>
+              <a:t>HDG Bit25</a:t>
+            </a:r>
+            <a:br>
+              <a:rPr lang="en-GB" dirty="0"/>
+            </a:br>
+            <a:r>
+              <a:rPr lang="en-GB" dirty="0"/>
+              <a:t>VNAV Bit26</a:t>
+            </a:r>
+            <a:br>
+              <a:rPr lang="en-GB" dirty="0"/>
+            </a:br>
+            <a:r>
+              <a:rPr lang="en-GB" dirty="0"/>
+              <a:t>LNAV Bit27</a:t>
+            </a:r>
+            <a:br>
+              <a:rPr lang="en-GB" dirty="0"/>
+            </a:br>
+            <a:r>
+              <a:rPr lang="en-GB" dirty="0"/>
+              <a:t>LOC Bit28</a:t>
+            </a:r>
+            <a:br>
+              <a:rPr lang="en-GB" dirty="0"/>
+            </a:br>
+            <a:r>
+              <a:rPr lang="en-GB" dirty="0"/>
+              <a:t>APP Bit29</a:t>
+            </a:r>
+            <a:br>
+              <a:rPr lang="en-GB" dirty="0"/>
+            </a:br>
+            <a:r>
+              <a:rPr lang="en-GB" dirty="0"/>
+              <a:t>ALT Bit30 (ALT HOLD!)</a:t>
+            </a:r>
+            <a:br>
+              <a:rPr lang="en-GB" dirty="0"/>
+            </a:br>
+            <a:r>
+              <a:rPr lang="en-GB" dirty="0"/>
+              <a:t>VS Bit31</a:t>
+            </a:r>
+            <a:endParaRPr lang="nl-NL" dirty="0"/>
+          </a:p>
+        </p:txBody>
+      </p:sp>
+      <p:sp>
+        <p:nvSpPr>
+          <p:cNvPr id="5" name="Tekstvak 4"/>
+          <p:cNvSpPr txBox="1"/>
+          <p:nvPr/>
+        </p:nvSpPr>
+        <p:spPr>
+          <a:xfrm>
+            <a:off x="467544" y="1484784"/>
+            <a:ext cx="2232248" cy="646331"/>
+          </a:xfrm>
+          <a:prstGeom prst="rect">
+            <a:avLst/>
+          </a:prstGeom>
+          <a:noFill/>
+        </p:spPr>
+        <p:txBody>
+          <a:bodyPr wrap="square" rtlCol="0">
+            <a:spAutoFit/>
+          </a:bodyPr>
+          <a:lstStyle/>
+          <a:p>
+            <a:r>
+              <a:rPr lang="nl-NL" b="1" dirty="0" smtClean="0"/>
+              <a:t>EPIC</a:t>
+            </a:r>
+          </a:p>
+          <a:p>
+            <a:endParaRPr lang="nl-NL" dirty="0"/>
+          </a:p>
+        </p:txBody>
+      </p:sp>
+    </p:spTree>
+    <p:extLst>
+      <p:ext uri="{BB962C8B-B14F-4D97-AF65-F5344CB8AC3E}">
+        <p14:creationId xmlns:p14="http://schemas.microsoft.com/office/powerpoint/2010/main" val="73420893"/>
+      </p:ext>
+    </p:extLst>
+  </p:cSld>
+  <p:clrMapOvr>
+    <a:masterClrMapping/>
+  </p:clrMapOvr>
+</p:sld>
+</file>
+
 <file path=ppt/slides/slide2.xml><?xml version="1.0" encoding="utf-8"?>
 <p:sld xmlns:a="http://schemas.openxmlformats.org/drawingml/2006/main" xmlns:r="http://schemas.openxmlformats.org/officeDocument/2006/relationships" xmlns:p="http://schemas.openxmlformats.org/presentationml/2006/main">
   <p:cSld>
@@ -5353,10 +5625,6 @@
           <a:bodyPr/>
           <a:lstStyle/>
           <a:p>
-            <a:r>
-              <a:rPr lang="nl-NL" dirty="0" smtClean="0"/>
-              <a:t>MCP Hardware</a:t>
-            </a:r>
             <a:endParaRPr lang="nl-NL" dirty="0"/>
           </a:p>
         </p:txBody>
@@ -5369,6 +5637,850 @@
         </p:nvSpPr>
         <p:spPr>
           <a:xfrm>
+            <a:off x="4421651" y="2870515"/>
+            <a:ext cx="1944216" cy="658146"/>
+          </a:xfrm>
+          <a:prstGeom prst="rect">
+            <a:avLst/>
+          </a:prstGeom>
+        </p:spPr>
+        <p:style>
+          <a:lnRef idx="2">
+            <a:schemeClr val="accent1">
+              <a:shade val="50000"/>
+            </a:schemeClr>
+          </a:lnRef>
+          <a:fillRef idx="1">
+            <a:schemeClr val="accent1"/>
+          </a:fillRef>
+          <a:effectRef idx="0">
+            <a:schemeClr val="accent1"/>
+          </a:effectRef>
+          <a:fontRef idx="minor">
+            <a:schemeClr val="lt1"/>
+          </a:fontRef>
+        </p:style>
+        <p:txBody>
+          <a:bodyPr rtlCol="0" anchor="ctr"/>
+          <a:lstStyle/>
+          <a:p>
+            <a:pPr algn="ctr"/>
+            <a:r>
+              <a:rPr lang="nl-NL" dirty="0" smtClean="0"/>
+              <a:t>Rotary Module </a:t>
+            </a:r>
+            <a:endParaRPr lang="nl-NL" dirty="0"/>
+          </a:p>
+        </p:txBody>
+      </p:sp>
+      <p:sp>
+        <p:nvSpPr>
+          <p:cNvPr id="5" name="Rechthoek 4"/>
+          <p:cNvSpPr/>
+          <p:nvPr/>
+        </p:nvSpPr>
+        <p:spPr>
+          <a:xfrm>
+            <a:off x="4427984" y="1774922"/>
+            <a:ext cx="1944216" cy="630493"/>
+          </a:xfrm>
+          <a:prstGeom prst="rect">
+            <a:avLst/>
+          </a:prstGeom>
+        </p:spPr>
+        <p:style>
+          <a:lnRef idx="2">
+            <a:schemeClr val="accent1">
+              <a:shade val="50000"/>
+            </a:schemeClr>
+          </a:lnRef>
+          <a:fillRef idx="1">
+            <a:schemeClr val="accent1"/>
+          </a:fillRef>
+          <a:effectRef idx="0">
+            <a:schemeClr val="accent1"/>
+          </a:effectRef>
+          <a:fontRef idx="minor">
+            <a:schemeClr val="lt1"/>
+          </a:fontRef>
+        </p:style>
+        <p:txBody>
+          <a:bodyPr rtlCol="0" anchor="ctr"/>
+          <a:lstStyle/>
+          <a:p>
+            <a:pPr algn="ctr"/>
+            <a:r>
+              <a:rPr lang="nl-NL" smtClean="0"/>
+              <a:t>64BTN Module</a:t>
+            </a:r>
+            <a:endParaRPr lang="nl-NL" dirty="0"/>
+          </a:p>
+        </p:txBody>
+      </p:sp>
+      <p:sp>
+        <p:nvSpPr>
+          <p:cNvPr id="6" name="Rechthoek 5"/>
+          <p:cNvSpPr/>
+          <p:nvPr/>
+        </p:nvSpPr>
+        <p:spPr>
+          <a:xfrm>
+            <a:off x="4451807" y="4044298"/>
+            <a:ext cx="1944216" cy="658146"/>
+          </a:xfrm>
+          <a:prstGeom prst="rect">
+            <a:avLst/>
+          </a:prstGeom>
+        </p:spPr>
+        <p:style>
+          <a:lnRef idx="2">
+            <a:schemeClr val="accent1">
+              <a:shade val="50000"/>
+            </a:schemeClr>
+          </a:lnRef>
+          <a:fillRef idx="1">
+            <a:schemeClr val="accent1"/>
+          </a:fillRef>
+          <a:effectRef idx="0">
+            <a:schemeClr val="accent1"/>
+          </a:effectRef>
+          <a:fontRef idx="minor">
+            <a:schemeClr val="lt1"/>
+          </a:fontRef>
+        </p:style>
+        <p:txBody>
+          <a:bodyPr rtlCol="0" anchor="ctr"/>
+          <a:lstStyle/>
+          <a:p>
+            <a:pPr algn="ctr"/>
+            <a:r>
+              <a:rPr lang="nl-NL" dirty="0" smtClean="0"/>
+              <a:t>32 Digit Display Controller </a:t>
+            </a:r>
+            <a:endParaRPr lang="nl-NL" dirty="0"/>
+          </a:p>
+        </p:txBody>
+      </p:sp>
+      <p:sp>
+        <p:nvSpPr>
+          <p:cNvPr id="7" name="Rechthoek 6"/>
+          <p:cNvSpPr/>
+          <p:nvPr/>
+        </p:nvSpPr>
+        <p:spPr>
+          <a:xfrm>
+            <a:off x="4451807" y="5229541"/>
+            <a:ext cx="1944216" cy="657469"/>
+          </a:xfrm>
+          <a:prstGeom prst="rect">
+            <a:avLst/>
+          </a:prstGeom>
+        </p:spPr>
+        <p:style>
+          <a:lnRef idx="2">
+            <a:schemeClr val="accent1">
+              <a:shade val="50000"/>
+            </a:schemeClr>
+          </a:lnRef>
+          <a:fillRef idx="1">
+            <a:schemeClr val="accent1"/>
+          </a:fillRef>
+          <a:effectRef idx="0">
+            <a:schemeClr val="accent1"/>
+          </a:effectRef>
+          <a:fontRef idx="minor">
+            <a:schemeClr val="lt1"/>
+          </a:fontRef>
+        </p:style>
+        <p:txBody>
+          <a:bodyPr rtlCol="0" anchor="ctr"/>
+          <a:lstStyle/>
+          <a:p>
+            <a:pPr algn="ctr"/>
+            <a:r>
+              <a:rPr lang="nl-NL" dirty="0" smtClean="0"/>
+              <a:t>32 Point Output Module </a:t>
+            </a:r>
+            <a:endParaRPr lang="nl-NL" dirty="0"/>
+          </a:p>
+        </p:txBody>
+      </p:sp>
+      <p:sp>
+        <p:nvSpPr>
+          <p:cNvPr id="8" name="Rechthoek 7"/>
+          <p:cNvSpPr/>
+          <p:nvPr/>
+        </p:nvSpPr>
+        <p:spPr>
+          <a:xfrm>
+            <a:off x="395536" y="3501008"/>
+            <a:ext cx="1152128" cy="457200"/>
+          </a:xfrm>
+          <a:prstGeom prst="rect">
+            <a:avLst/>
+          </a:prstGeom>
+        </p:spPr>
+        <p:style>
+          <a:lnRef idx="2">
+            <a:schemeClr val="accent1">
+              <a:shade val="50000"/>
+            </a:schemeClr>
+          </a:lnRef>
+          <a:fillRef idx="1">
+            <a:schemeClr val="accent1"/>
+          </a:fillRef>
+          <a:effectRef idx="0">
+            <a:schemeClr val="accent1"/>
+          </a:effectRef>
+          <a:fontRef idx="minor">
+            <a:schemeClr val="lt1"/>
+          </a:fontRef>
+        </p:style>
+        <p:txBody>
+          <a:bodyPr rtlCol="0" anchor="ctr"/>
+          <a:lstStyle/>
+          <a:p>
+            <a:pPr algn="ctr"/>
+            <a:r>
+              <a:rPr lang="nl-NL" dirty="0" smtClean="0"/>
+              <a:t>MCP</a:t>
+            </a:r>
+            <a:endParaRPr lang="nl-NL" dirty="0"/>
+          </a:p>
+        </p:txBody>
+      </p:sp>
+      <p:cxnSp>
+        <p:nvCxnSpPr>
+          <p:cNvPr id="10" name="Rechte verbindingslijn 9"/>
+          <p:cNvCxnSpPr>
+            <a:stCxn id="8" idx="3"/>
+            <a:endCxn id="17" idx="1"/>
+          </p:cNvCxnSpPr>
+          <p:nvPr/>
+        </p:nvCxnSpPr>
+        <p:spPr>
+          <a:xfrm flipV="1">
+            <a:off x="1547664" y="2090169"/>
+            <a:ext cx="720080" cy="1639439"/>
+          </a:xfrm>
+          <a:prstGeom prst="line">
+            <a:avLst/>
+          </a:prstGeom>
+        </p:spPr>
+        <p:style>
+          <a:lnRef idx="1">
+            <a:schemeClr val="accent1"/>
+          </a:lnRef>
+          <a:fillRef idx="0">
+            <a:schemeClr val="accent1"/>
+          </a:fillRef>
+          <a:effectRef idx="0">
+            <a:schemeClr val="accent1"/>
+          </a:effectRef>
+          <a:fontRef idx="minor">
+            <a:schemeClr val="tx1"/>
+          </a:fontRef>
+        </p:style>
+      </p:cxnSp>
+      <p:cxnSp>
+        <p:nvCxnSpPr>
+          <p:cNvPr id="12" name="Rechte verbindingslijn 11"/>
+          <p:cNvCxnSpPr>
+            <a:stCxn id="8" idx="3"/>
+            <a:endCxn id="30" idx="1"/>
+          </p:cNvCxnSpPr>
+          <p:nvPr/>
+        </p:nvCxnSpPr>
+        <p:spPr>
+          <a:xfrm flipV="1">
+            <a:off x="1547664" y="3199588"/>
+            <a:ext cx="720080" cy="530020"/>
+          </a:xfrm>
+          <a:prstGeom prst="line">
+            <a:avLst/>
+          </a:prstGeom>
+        </p:spPr>
+        <p:style>
+          <a:lnRef idx="1">
+            <a:schemeClr val="accent1"/>
+          </a:lnRef>
+          <a:fillRef idx="0">
+            <a:schemeClr val="accent1"/>
+          </a:fillRef>
+          <a:effectRef idx="0">
+            <a:schemeClr val="accent1"/>
+          </a:effectRef>
+          <a:fontRef idx="minor">
+            <a:schemeClr val="tx1"/>
+          </a:fontRef>
+        </p:style>
+      </p:cxnSp>
+      <p:cxnSp>
+        <p:nvCxnSpPr>
+          <p:cNvPr id="14" name="Rechte verbindingslijn 13"/>
+          <p:cNvCxnSpPr>
+            <a:stCxn id="8" idx="3"/>
+            <a:endCxn id="18" idx="1"/>
+          </p:cNvCxnSpPr>
+          <p:nvPr/>
+        </p:nvCxnSpPr>
+        <p:spPr>
+          <a:xfrm>
+            <a:off x="1547664" y="3729608"/>
+            <a:ext cx="720080" cy="643763"/>
+          </a:xfrm>
+          <a:prstGeom prst="line">
+            <a:avLst/>
+          </a:prstGeom>
+        </p:spPr>
+        <p:style>
+          <a:lnRef idx="1">
+            <a:schemeClr val="accent1"/>
+          </a:lnRef>
+          <a:fillRef idx="0">
+            <a:schemeClr val="accent1"/>
+          </a:fillRef>
+          <a:effectRef idx="0">
+            <a:schemeClr val="accent1"/>
+          </a:effectRef>
+          <a:fontRef idx="minor">
+            <a:schemeClr val="tx1"/>
+          </a:fontRef>
+        </p:style>
+      </p:cxnSp>
+      <p:cxnSp>
+        <p:nvCxnSpPr>
+          <p:cNvPr id="16" name="Rechte verbindingslijn 15"/>
+          <p:cNvCxnSpPr>
+            <a:stCxn id="8" idx="3"/>
+            <a:endCxn id="19" idx="1"/>
+          </p:cNvCxnSpPr>
+          <p:nvPr/>
+        </p:nvCxnSpPr>
+        <p:spPr>
+          <a:xfrm>
+            <a:off x="1547664" y="3729608"/>
+            <a:ext cx="722922" cy="1828668"/>
+          </a:xfrm>
+          <a:prstGeom prst="line">
+            <a:avLst/>
+          </a:prstGeom>
+        </p:spPr>
+        <p:style>
+          <a:lnRef idx="1">
+            <a:schemeClr val="accent1"/>
+          </a:lnRef>
+          <a:fillRef idx="0">
+            <a:schemeClr val="accent1"/>
+          </a:fillRef>
+          <a:effectRef idx="0">
+            <a:schemeClr val="accent1"/>
+          </a:effectRef>
+          <a:fontRef idx="minor">
+            <a:schemeClr val="tx1"/>
+          </a:fontRef>
+        </p:style>
+      </p:cxnSp>
+      <p:sp>
+        <p:nvSpPr>
+          <p:cNvPr id="17" name="Rechthoek 16"/>
+          <p:cNvSpPr/>
+          <p:nvPr/>
+        </p:nvSpPr>
+        <p:spPr>
+          <a:xfrm>
+            <a:off x="2267744" y="1774922"/>
+            <a:ext cx="1440160" cy="630493"/>
+          </a:xfrm>
+          <a:prstGeom prst="rect">
+            <a:avLst/>
+          </a:prstGeom>
+        </p:spPr>
+        <p:style>
+          <a:lnRef idx="2">
+            <a:schemeClr val="accent1">
+              <a:shade val="50000"/>
+            </a:schemeClr>
+          </a:lnRef>
+          <a:fillRef idx="1">
+            <a:schemeClr val="accent1"/>
+          </a:fillRef>
+          <a:effectRef idx="0">
+            <a:schemeClr val="accent1"/>
+          </a:effectRef>
+          <a:fontRef idx="minor">
+            <a:schemeClr val="lt1"/>
+          </a:fontRef>
+        </p:style>
+        <p:txBody>
+          <a:bodyPr rtlCol="0" anchor="ctr"/>
+          <a:lstStyle/>
+          <a:p>
+            <a:pPr algn="ctr"/>
+            <a:r>
+              <a:rPr lang="nl-NL" dirty="0" smtClean="0"/>
+              <a:t>MCP Buttons</a:t>
+            </a:r>
+            <a:endParaRPr lang="nl-NL" dirty="0"/>
+          </a:p>
+        </p:txBody>
+      </p:sp>
+      <p:sp>
+        <p:nvSpPr>
+          <p:cNvPr id="18" name="Rechthoek 17"/>
+          <p:cNvSpPr/>
+          <p:nvPr/>
+        </p:nvSpPr>
+        <p:spPr>
+          <a:xfrm>
+            <a:off x="2267744" y="4044298"/>
+            <a:ext cx="1441581" cy="658146"/>
+          </a:xfrm>
+          <a:prstGeom prst="rect">
+            <a:avLst/>
+          </a:prstGeom>
+        </p:spPr>
+        <p:style>
+          <a:lnRef idx="2">
+            <a:schemeClr val="accent1">
+              <a:shade val="50000"/>
+            </a:schemeClr>
+          </a:lnRef>
+          <a:fillRef idx="1">
+            <a:schemeClr val="accent1"/>
+          </a:fillRef>
+          <a:effectRef idx="0">
+            <a:schemeClr val="accent1"/>
+          </a:effectRef>
+          <a:fontRef idx="minor">
+            <a:schemeClr val="lt1"/>
+          </a:fontRef>
+        </p:style>
+        <p:txBody>
+          <a:bodyPr rtlCol="0" anchor="ctr"/>
+          <a:lstStyle/>
+          <a:p>
+            <a:pPr algn="ctr"/>
+            <a:r>
+              <a:rPr lang="nl-NL" dirty="0" smtClean="0"/>
+              <a:t>MCP Displays</a:t>
+            </a:r>
+            <a:endParaRPr lang="nl-NL" dirty="0"/>
+          </a:p>
+        </p:txBody>
+      </p:sp>
+      <p:sp>
+        <p:nvSpPr>
+          <p:cNvPr id="19" name="Rechthoek 18"/>
+          <p:cNvSpPr/>
+          <p:nvPr/>
+        </p:nvSpPr>
+        <p:spPr>
+          <a:xfrm>
+            <a:off x="2270586" y="5229541"/>
+            <a:ext cx="1438739" cy="657469"/>
+          </a:xfrm>
+          <a:prstGeom prst="rect">
+            <a:avLst/>
+          </a:prstGeom>
+        </p:spPr>
+        <p:style>
+          <a:lnRef idx="2">
+            <a:schemeClr val="accent1">
+              <a:shade val="50000"/>
+            </a:schemeClr>
+          </a:lnRef>
+          <a:fillRef idx="1">
+            <a:schemeClr val="accent1"/>
+          </a:fillRef>
+          <a:effectRef idx="0">
+            <a:schemeClr val="accent1"/>
+          </a:effectRef>
+          <a:fontRef idx="minor">
+            <a:schemeClr val="lt1"/>
+          </a:fontRef>
+        </p:style>
+        <p:txBody>
+          <a:bodyPr rtlCol="0" anchor="ctr"/>
+          <a:lstStyle/>
+          <a:p>
+            <a:pPr algn="ctr"/>
+            <a:r>
+              <a:rPr lang="nl-NL" dirty="0" smtClean="0"/>
+              <a:t>MCP </a:t>
+            </a:r>
+            <a:r>
+              <a:rPr lang="nl-NL" dirty="0" err="1" smtClean="0"/>
+              <a:t>Leds</a:t>
+            </a:r>
+            <a:endParaRPr lang="nl-NL" dirty="0"/>
+          </a:p>
+        </p:txBody>
+      </p:sp>
+      <p:sp>
+        <p:nvSpPr>
+          <p:cNvPr id="30" name="Rechthoek 29"/>
+          <p:cNvSpPr/>
+          <p:nvPr/>
+        </p:nvSpPr>
+        <p:spPr>
+          <a:xfrm>
+            <a:off x="2267744" y="2870515"/>
+            <a:ext cx="1421567" cy="658146"/>
+          </a:xfrm>
+          <a:prstGeom prst="rect">
+            <a:avLst/>
+          </a:prstGeom>
+        </p:spPr>
+        <p:style>
+          <a:lnRef idx="2">
+            <a:schemeClr val="accent1">
+              <a:shade val="50000"/>
+            </a:schemeClr>
+          </a:lnRef>
+          <a:fillRef idx="1">
+            <a:schemeClr val="accent1"/>
+          </a:fillRef>
+          <a:effectRef idx="0">
+            <a:schemeClr val="accent1"/>
+          </a:effectRef>
+          <a:fontRef idx="minor">
+            <a:schemeClr val="lt1"/>
+          </a:fontRef>
+        </p:style>
+        <p:txBody>
+          <a:bodyPr rtlCol="0" anchor="ctr"/>
+          <a:lstStyle/>
+          <a:p>
+            <a:pPr algn="ctr"/>
+            <a:r>
+              <a:rPr lang="nl-NL" dirty="0" smtClean="0"/>
+              <a:t>MCP </a:t>
+            </a:r>
+            <a:r>
+              <a:rPr lang="nl-NL" dirty="0" err="1" smtClean="0"/>
+              <a:t>Rotaries</a:t>
+            </a:r>
+            <a:endParaRPr lang="nl-NL" dirty="0" smtClean="0"/>
+          </a:p>
+        </p:txBody>
+      </p:sp>
+      <p:cxnSp>
+        <p:nvCxnSpPr>
+          <p:cNvPr id="34" name="Rechte verbindingslijn 33"/>
+          <p:cNvCxnSpPr>
+            <a:stCxn id="17" idx="3"/>
+            <a:endCxn id="5" idx="1"/>
+          </p:cNvCxnSpPr>
+          <p:nvPr/>
+        </p:nvCxnSpPr>
+        <p:spPr>
+          <a:xfrm>
+            <a:off x="3707904" y="2090169"/>
+            <a:ext cx="720080" cy="0"/>
+          </a:xfrm>
+          <a:prstGeom prst="line">
+            <a:avLst/>
+          </a:prstGeom>
+        </p:spPr>
+        <p:style>
+          <a:lnRef idx="1">
+            <a:schemeClr val="accent1"/>
+          </a:lnRef>
+          <a:fillRef idx="0">
+            <a:schemeClr val="accent1"/>
+          </a:fillRef>
+          <a:effectRef idx="0">
+            <a:schemeClr val="accent1"/>
+          </a:effectRef>
+          <a:fontRef idx="minor">
+            <a:schemeClr val="tx1"/>
+          </a:fontRef>
+        </p:style>
+      </p:cxnSp>
+      <p:cxnSp>
+        <p:nvCxnSpPr>
+          <p:cNvPr id="38" name="Rechte verbindingslijn 37"/>
+          <p:cNvCxnSpPr>
+            <a:stCxn id="30" idx="3"/>
+            <a:endCxn id="4" idx="1"/>
+          </p:cNvCxnSpPr>
+          <p:nvPr/>
+        </p:nvCxnSpPr>
+        <p:spPr>
+          <a:xfrm>
+            <a:off x="3689311" y="3199588"/>
+            <a:ext cx="732340" cy="0"/>
+          </a:xfrm>
+          <a:prstGeom prst="line">
+            <a:avLst/>
+          </a:prstGeom>
+        </p:spPr>
+        <p:style>
+          <a:lnRef idx="1">
+            <a:schemeClr val="accent1"/>
+          </a:lnRef>
+          <a:fillRef idx="0">
+            <a:schemeClr val="accent1"/>
+          </a:fillRef>
+          <a:effectRef idx="0">
+            <a:schemeClr val="accent1"/>
+          </a:effectRef>
+          <a:fontRef idx="minor">
+            <a:schemeClr val="tx1"/>
+          </a:fontRef>
+        </p:style>
+      </p:cxnSp>
+      <p:cxnSp>
+        <p:nvCxnSpPr>
+          <p:cNvPr id="41" name="Rechte verbindingslijn 40"/>
+          <p:cNvCxnSpPr>
+            <a:stCxn id="18" idx="3"/>
+            <a:endCxn id="6" idx="1"/>
+          </p:cNvCxnSpPr>
+          <p:nvPr/>
+        </p:nvCxnSpPr>
+        <p:spPr>
+          <a:xfrm>
+            <a:off x="3709325" y="4373371"/>
+            <a:ext cx="742482" cy="0"/>
+          </a:xfrm>
+          <a:prstGeom prst="line">
+            <a:avLst/>
+          </a:prstGeom>
+        </p:spPr>
+        <p:style>
+          <a:lnRef idx="1">
+            <a:schemeClr val="accent1"/>
+          </a:lnRef>
+          <a:fillRef idx="0">
+            <a:schemeClr val="accent1"/>
+          </a:fillRef>
+          <a:effectRef idx="0">
+            <a:schemeClr val="accent1"/>
+          </a:effectRef>
+          <a:fontRef idx="minor">
+            <a:schemeClr val="tx1"/>
+          </a:fontRef>
+        </p:style>
+      </p:cxnSp>
+      <p:cxnSp>
+        <p:nvCxnSpPr>
+          <p:cNvPr id="43" name="Rechte verbindingslijn 42"/>
+          <p:cNvCxnSpPr>
+            <a:stCxn id="19" idx="3"/>
+            <a:endCxn id="7" idx="1"/>
+          </p:cNvCxnSpPr>
+          <p:nvPr/>
+        </p:nvCxnSpPr>
+        <p:spPr>
+          <a:xfrm>
+            <a:off x="3709325" y="5558276"/>
+            <a:ext cx="742482" cy="0"/>
+          </a:xfrm>
+          <a:prstGeom prst="line">
+            <a:avLst/>
+          </a:prstGeom>
+        </p:spPr>
+        <p:style>
+          <a:lnRef idx="1">
+            <a:schemeClr val="accent1"/>
+          </a:lnRef>
+          <a:fillRef idx="0">
+            <a:schemeClr val="accent1"/>
+          </a:fillRef>
+          <a:effectRef idx="0">
+            <a:schemeClr val="accent1"/>
+          </a:effectRef>
+          <a:fontRef idx="minor">
+            <a:schemeClr val="tx1"/>
+          </a:fontRef>
+        </p:style>
+      </p:cxnSp>
+      <p:sp>
+        <p:nvSpPr>
+          <p:cNvPr id="102" name="Tekstvak 101"/>
+          <p:cNvSpPr txBox="1"/>
+          <p:nvPr/>
+        </p:nvSpPr>
+        <p:spPr>
+          <a:xfrm>
+            <a:off x="6516216" y="1590256"/>
+            <a:ext cx="2520280" cy="923330"/>
+          </a:xfrm>
+          <a:prstGeom prst="rect">
+            <a:avLst/>
+          </a:prstGeom>
+          <a:noFill/>
+        </p:spPr>
+        <p:txBody>
+          <a:bodyPr wrap="square" rtlCol="0">
+            <a:spAutoFit/>
+          </a:bodyPr>
+          <a:lstStyle/>
+          <a:p>
+            <a:r>
+              <a:rPr lang="nl-NL" dirty="0" smtClean="0"/>
+              <a:t>M1/R4/B0 – M1/R4/B7</a:t>
+            </a:r>
+          </a:p>
+          <a:p>
+            <a:r>
+              <a:rPr lang="nl-NL" dirty="0" smtClean="0"/>
+              <a:t>M1/R0/B0 </a:t>
+            </a:r>
+            <a:r>
+              <a:rPr lang="nl-NL" dirty="0"/>
+              <a:t>– </a:t>
+            </a:r>
+            <a:r>
+              <a:rPr lang="nl-NL" dirty="0" smtClean="0"/>
+              <a:t>M1/R0/B7 </a:t>
+            </a:r>
+            <a:endParaRPr lang="nl-NL" dirty="0"/>
+          </a:p>
+          <a:p>
+            <a:r>
+              <a:rPr lang="nl-NL" dirty="0" smtClean="0"/>
+              <a:t>M1/R1/B0 </a:t>
+            </a:r>
+            <a:r>
+              <a:rPr lang="nl-NL" dirty="0"/>
+              <a:t>– </a:t>
+            </a:r>
+            <a:r>
+              <a:rPr lang="nl-NL" dirty="0" smtClean="0"/>
+              <a:t>M1/R1/B2</a:t>
+            </a:r>
+            <a:endParaRPr lang="nl-NL" dirty="0"/>
+          </a:p>
+        </p:txBody>
+      </p:sp>
+      <p:sp>
+        <p:nvSpPr>
+          <p:cNvPr id="103" name="Tekstvak 102"/>
+          <p:cNvSpPr txBox="1"/>
+          <p:nvPr/>
+        </p:nvSpPr>
+        <p:spPr>
+          <a:xfrm>
+            <a:off x="6804248" y="5122058"/>
+            <a:ext cx="2088232" cy="646331"/>
+          </a:xfrm>
+          <a:prstGeom prst="rect">
+            <a:avLst/>
+          </a:prstGeom>
+          <a:noFill/>
+        </p:spPr>
+        <p:txBody>
+          <a:bodyPr wrap="square" rtlCol="0">
+            <a:spAutoFit/>
+          </a:bodyPr>
+          <a:lstStyle/>
+          <a:p>
+            <a:r>
+              <a:rPr lang="nl-NL" dirty="0" err="1" smtClean="0"/>
+              <a:t>wire</a:t>
+            </a:r>
+            <a:r>
+              <a:rPr lang="nl-NL" dirty="0" smtClean="0"/>
+              <a:t> </a:t>
+            </a:r>
+            <a:r>
+              <a:rPr lang="nl-NL" dirty="0"/>
+              <a:t>#</a:t>
+            </a:r>
+            <a:r>
+              <a:rPr lang="nl-NL" dirty="0" smtClean="0"/>
+              <a:t>3 - </a:t>
+            </a:r>
+            <a:r>
+              <a:rPr lang="nl-NL" dirty="0" err="1" smtClean="0"/>
+              <a:t>wire</a:t>
+            </a:r>
+            <a:r>
+              <a:rPr lang="nl-NL" dirty="0" smtClean="0"/>
+              <a:t> #14</a:t>
+            </a:r>
+          </a:p>
+          <a:p>
+            <a:r>
+              <a:rPr lang="nl-NL" dirty="0" err="1" smtClean="0"/>
+              <a:t>Wire</a:t>
+            </a:r>
+            <a:r>
+              <a:rPr lang="nl-NL" dirty="0" smtClean="0"/>
+              <a:t> #16</a:t>
+            </a:r>
+            <a:endParaRPr lang="nl-NL" dirty="0"/>
+          </a:p>
+        </p:txBody>
+      </p:sp>
+    </p:spTree>
+    <p:extLst>
+      <p:ext uri="{BB962C8B-B14F-4D97-AF65-F5344CB8AC3E}">
+        <p14:creationId xmlns:p14="http://schemas.microsoft.com/office/powerpoint/2010/main" val="672355554"/>
+      </p:ext>
+    </p:extLst>
+  </p:cSld>
+  <p:clrMapOvr>
+    <a:masterClrMapping/>
+  </p:clrMapOvr>
+</p:sld>
+</file>
+
+<file path=ppt/slides/slide7.xml><?xml version="1.0" encoding="utf-8"?>
+<p:sld xmlns:a="http://schemas.openxmlformats.org/drawingml/2006/main" xmlns:r="http://schemas.openxmlformats.org/officeDocument/2006/relationships" xmlns:p="http://schemas.openxmlformats.org/presentationml/2006/main">
+  <p:cSld>
+    <p:spTree>
+      <p:nvGrpSpPr>
+        <p:cNvPr id="1" name=""/>
+        <p:cNvGrpSpPr/>
+        <p:nvPr/>
+      </p:nvGrpSpPr>
+      <p:grpSpPr>
+        <a:xfrm>
+          <a:off x="0" y="0"/>
+          <a:ext cx="0" cy="0"/>
+          <a:chOff x="0" y="0"/>
+          <a:chExt cx="0" cy="0"/>
+        </a:xfrm>
+      </p:grpSpPr>
+      <p:sp>
+        <p:nvSpPr>
+          <p:cNvPr id="2" name="Titel 1"/>
+          <p:cNvSpPr>
+            <a:spLocks noGrp="1"/>
+          </p:cNvSpPr>
+          <p:nvPr>
+            <p:ph type="title"/>
+          </p:nvPr>
+        </p:nvSpPr>
+        <p:spPr/>
+        <p:txBody>
+          <a:bodyPr/>
+          <a:lstStyle/>
+          <a:p>
+            <a:r>
+              <a:rPr lang="nl-NL" dirty="0" smtClean="0"/>
+              <a:t>MCP </a:t>
+            </a:r>
+            <a:r>
+              <a:rPr lang="nl-NL" dirty="0" err="1" smtClean="0"/>
+              <a:t>Leds</a:t>
+            </a:r>
+            <a:endParaRPr lang="nl-NL" dirty="0"/>
+          </a:p>
+        </p:txBody>
+      </p:sp>
+      <p:sp>
+        <p:nvSpPr>
+          <p:cNvPr id="4" name="Rechthoek 3"/>
+          <p:cNvSpPr/>
+          <p:nvPr/>
+        </p:nvSpPr>
+        <p:spPr>
+          <a:xfrm>
             <a:off x="395536" y="1268760"/>
             <a:ext cx="6264696" cy="3693319"/>
           </a:xfrm>
@@ -5821,11 +6933,11 @@
               <a:t>wire</a:t>
             </a:r>
             <a:r>
-              <a:rPr lang="nl-NL"/>
+              <a:rPr lang="nl-NL" dirty="0"/>
               <a:t> </a:t>
             </a:r>
             <a:r>
-              <a:rPr lang="nl-NL" smtClean="0"/>
+              <a:rPr lang="nl-NL" dirty="0" smtClean="0"/>
               <a:t>#16 </a:t>
             </a:r>
             <a:endParaRPr lang="nl-NL" dirty="0"/>
@@ -5836,6 +6948,420 @@
     <p:extLst>
       <p:ext uri="{BB962C8B-B14F-4D97-AF65-F5344CB8AC3E}">
         <p14:creationId xmlns:p14="http://schemas.microsoft.com/office/powerpoint/2010/main" val="1474203528"/>
+      </p:ext>
+    </p:extLst>
+  </p:cSld>
+  <p:clrMapOvr>
+    <a:masterClrMapping/>
+  </p:clrMapOvr>
+</p:sld>
+</file>
+
+<file path=ppt/slides/slide8.xml><?xml version="1.0" encoding="utf-8"?>
+<p:sld xmlns:a="http://schemas.openxmlformats.org/drawingml/2006/main" xmlns:r="http://schemas.openxmlformats.org/officeDocument/2006/relationships" xmlns:p="http://schemas.openxmlformats.org/presentationml/2006/main">
+  <p:cSld>
+    <p:spTree>
+      <p:nvGrpSpPr>
+        <p:cNvPr id="1" name=""/>
+        <p:cNvGrpSpPr/>
+        <p:nvPr/>
+      </p:nvGrpSpPr>
+      <p:grpSpPr>
+        <a:xfrm>
+          <a:off x="0" y="0"/>
+          <a:ext cx="0" cy="0"/>
+          <a:chOff x="0" y="0"/>
+          <a:chExt cx="0" cy="0"/>
+        </a:xfrm>
+      </p:grpSpPr>
+      <p:sp>
+        <p:nvSpPr>
+          <p:cNvPr id="2" name="Titel 1"/>
+          <p:cNvSpPr>
+            <a:spLocks noGrp="1"/>
+          </p:cNvSpPr>
+          <p:nvPr>
+            <p:ph type="title"/>
+          </p:nvPr>
+        </p:nvSpPr>
+        <p:spPr/>
+        <p:txBody>
+          <a:bodyPr/>
+          <a:lstStyle/>
+          <a:p>
+            <a:r>
+              <a:rPr lang="nl-NL" dirty="0" smtClean="0"/>
+              <a:t>MCP Buttons</a:t>
+            </a:r>
+            <a:endParaRPr lang="nl-NL" dirty="0"/>
+          </a:p>
+        </p:txBody>
+      </p:sp>
+      <p:sp>
+        <p:nvSpPr>
+          <p:cNvPr id="4" name="Rechthoek 3"/>
+          <p:cNvSpPr/>
+          <p:nvPr/>
+        </p:nvSpPr>
+        <p:spPr>
+          <a:xfrm>
+            <a:off x="179512" y="188640"/>
+            <a:ext cx="8640960" cy="6463308"/>
+          </a:xfrm>
+          <a:prstGeom prst="rect">
+            <a:avLst/>
+          </a:prstGeom>
+        </p:spPr>
+        <p:txBody>
+          <a:bodyPr wrap="square">
+            <a:spAutoFit/>
+          </a:bodyPr>
+          <a:lstStyle/>
+          <a:p>
+            <a:r>
+              <a:rPr lang="nl-NL" dirty="0"/>
+              <a:t>button(2,0,b_LNAV);		// 64 button module: M1/R4/B0 </a:t>
+            </a:r>
+          </a:p>
+          <a:p>
+            <a:r>
+              <a:rPr lang="nl-NL" dirty="0"/>
+              <a:t>  button(2,1,b_VNAV);		// 64 button module: M1/R4/B1</a:t>
+            </a:r>
+          </a:p>
+          <a:p>
+            <a:r>
+              <a:rPr lang="nl-NL" dirty="0"/>
+              <a:t>  button(2,2,b_FLCH);		// 64 button module: M1/R4/B2</a:t>
+            </a:r>
+          </a:p>
+          <a:p>
+            <a:r>
+              <a:rPr lang="nl-NL" dirty="0"/>
+              <a:t>  button(2,3,b_SPD_MACH);	// 64 button module: M1/R4/B3</a:t>
+            </a:r>
+          </a:p>
+          <a:p>
+            <a:r>
+              <a:rPr lang="nl-NL" dirty="0"/>
+              <a:t>  button(2,4,b_ATHR);		// 64 button module: M1/R4/B4</a:t>
+            </a:r>
+          </a:p>
+          <a:p>
+            <a:r>
+              <a:rPr lang="nl-NL" dirty="0"/>
+              <a:t>  button(2,5,b_THR);		// 64 button module: M1/R4/B5</a:t>
+            </a:r>
+          </a:p>
+          <a:p>
+            <a:r>
+              <a:rPr lang="nl-NL" dirty="0"/>
+              <a:t>  button(2,6,b_SPD);		// 64 button module: M1/R4/B6</a:t>
+            </a:r>
+          </a:p>
+          <a:p>
+            <a:r>
+              <a:rPr lang="nl-NL" dirty="0"/>
+              <a:t>  button(2,7,b_FO_FD);		// 64 button module: M1/R4/B7	</a:t>
+            </a:r>
+          </a:p>
+          <a:p>
+            <a:r>
+              <a:rPr lang="nl-NL" dirty="0"/>
+              <a:t>  button(3,0,b_HDG);		// 64 button module: M1/R0/B0</a:t>
+            </a:r>
+          </a:p>
+          <a:p>
+            <a:r>
+              <a:rPr lang="nl-NL" dirty="0"/>
+              <a:t>  button(3,1,b_VS);		// 64 button module: M1/R0/B1</a:t>
+            </a:r>
+          </a:p>
+          <a:p>
+            <a:r>
+              <a:rPr lang="nl-NL" dirty="0"/>
+              <a:t>  button(3,2,b_ALT);		// 64 button module: M1/R0/B2</a:t>
+            </a:r>
+          </a:p>
+          <a:p>
+            <a:r>
+              <a:rPr lang="nl-NL" dirty="0"/>
+              <a:t>  button(3,3,b_APP);		// 64 button module: M1/R0/B3</a:t>
+            </a:r>
+          </a:p>
+          <a:p>
+            <a:r>
+              <a:rPr lang="nl-NL" dirty="0"/>
+              <a:t>  button(3,4,b_LOC);		// 64 button module: M1/R0/B4</a:t>
+            </a:r>
+          </a:p>
+          <a:p>
+            <a:r>
+              <a:rPr lang="nl-NL" dirty="0"/>
+              <a:t>  button(3,5,b_AP1);		// 64 button module: M1/R0/B5</a:t>
+            </a:r>
+          </a:p>
+          <a:p>
+            <a:r>
+              <a:rPr lang="nl-NL" dirty="0"/>
+              <a:t>  button(3,6,b_AP2);		// 64 button module: M1/R0/B6</a:t>
+            </a:r>
+          </a:p>
+          <a:p>
+            <a:r>
+              <a:rPr lang="nl-NL" dirty="0"/>
+              <a:t>  button(3,7,b_AP_Dis_lft);	// 64 button module: M1/R0/B7</a:t>
+            </a:r>
+          </a:p>
+          <a:p>
+            <a:r>
+              <a:rPr lang="nl-NL" dirty="0"/>
+              <a:t>  button(4,0,b_AP3);		// 64 button module: M1/R1/B0</a:t>
+            </a:r>
+          </a:p>
+          <a:p>
+            <a:r>
+              <a:rPr lang="nl-NL" dirty="0"/>
+              <a:t>  button(4,1,b_AP_Dis_rgt);	// 64 button module: M1/R1/B1				</a:t>
+            </a:r>
+          </a:p>
+          <a:p>
+            <a:r>
+              <a:rPr lang="nl-NL" dirty="0"/>
+              <a:t>  button(4,2,b_CP_FD);		// 64 button module: M1/R1/B2</a:t>
+            </a:r>
+          </a:p>
+          <a:p>
+            <a:r>
+              <a:rPr lang="nl-NL" dirty="0"/>
+              <a:t>  button(5,5,b_SPD_ROT);</a:t>
+            </a:r>
+          </a:p>
+          <a:p>
+            <a:r>
+              <a:rPr lang="nl-NL" dirty="0"/>
+              <a:t>  button(5,6,b_ALT_ROT);</a:t>
+            </a:r>
+          </a:p>
+          <a:p>
+            <a:r>
+              <a:rPr lang="nl-NL" dirty="0"/>
+              <a:t>  button(5,7,b_HDG_ROT);</a:t>
+            </a:r>
+          </a:p>
+        </p:txBody>
+      </p:sp>
+    </p:spTree>
+    <p:extLst>
+      <p:ext uri="{BB962C8B-B14F-4D97-AF65-F5344CB8AC3E}">
+        <p14:creationId xmlns:p14="http://schemas.microsoft.com/office/powerpoint/2010/main" val="1758439249"/>
+      </p:ext>
+    </p:extLst>
+  </p:cSld>
+  <p:clrMapOvr>
+    <a:masterClrMapping/>
+  </p:clrMapOvr>
+</p:sld>
+</file>
+
+<file path=ppt/slides/slide9.xml><?xml version="1.0" encoding="utf-8"?>
+<p:sld xmlns:a="http://schemas.openxmlformats.org/drawingml/2006/main" xmlns:r="http://schemas.openxmlformats.org/officeDocument/2006/relationships" xmlns:p="http://schemas.openxmlformats.org/presentationml/2006/main">
+  <p:cSld>
+    <p:spTree>
+      <p:nvGrpSpPr>
+        <p:cNvPr id="1" name=""/>
+        <p:cNvGrpSpPr/>
+        <p:nvPr/>
+      </p:nvGrpSpPr>
+      <p:grpSpPr>
+        <a:xfrm>
+          <a:off x="0" y="0"/>
+          <a:ext cx="0" cy="0"/>
+          <a:chOff x="0" y="0"/>
+          <a:chExt cx="0" cy="0"/>
+        </a:xfrm>
+      </p:grpSpPr>
+      <p:sp>
+        <p:nvSpPr>
+          <p:cNvPr id="2" name="Titel 1"/>
+          <p:cNvSpPr>
+            <a:spLocks noGrp="1"/>
+          </p:cNvSpPr>
+          <p:nvPr>
+            <p:ph type="title"/>
+          </p:nvPr>
+        </p:nvSpPr>
+        <p:spPr/>
+        <p:txBody>
+          <a:bodyPr/>
+          <a:lstStyle/>
+          <a:p>
+            <a:r>
+              <a:rPr lang="nl-NL" dirty="0" smtClean="0"/>
+              <a:t>EPICINFO.CFG - MCP</a:t>
+            </a:r>
+            <a:endParaRPr lang="nl-NL" dirty="0"/>
+          </a:p>
+        </p:txBody>
+      </p:sp>
+      <p:sp>
+        <p:nvSpPr>
+          <p:cNvPr id="4" name="Rechthoek 3"/>
+          <p:cNvSpPr/>
+          <p:nvPr/>
+        </p:nvSpPr>
+        <p:spPr>
+          <a:xfrm>
+            <a:off x="5220072" y="2492896"/>
+            <a:ext cx="652743" cy="369332"/>
+          </a:xfrm>
+          <a:prstGeom prst="rect">
+            <a:avLst/>
+          </a:prstGeom>
+        </p:spPr>
+        <p:txBody>
+          <a:bodyPr wrap="none">
+            <a:spAutoFit/>
+          </a:bodyPr>
+          <a:lstStyle/>
+          <a:p>
+            <a:r>
+              <a:rPr lang="nl-NL" dirty="0"/>
+              <a:t>5413</a:t>
+            </a:r>
+          </a:p>
+        </p:txBody>
+      </p:sp>
+      <p:sp>
+        <p:nvSpPr>
+          <p:cNvPr id="5" name="Rechthoek 4"/>
+          <p:cNvSpPr/>
+          <p:nvPr/>
+        </p:nvSpPr>
+        <p:spPr>
+          <a:xfrm>
+            <a:off x="1331640" y="2492896"/>
+            <a:ext cx="3153940" cy="369332"/>
+          </a:xfrm>
+          <a:prstGeom prst="rect">
+            <a:avLst/>
+          </a:prstGeom>
+        </p:spPr>
+        <p:txBody>
+          <a:bodyPr wrap="none">
+            <a:spAutoFit/>
+          </a:bodyPr>
+          <a:lstStyle/>
+          <a:p>
+            <a:r>
+              <a:rPr lang="en-GB" dirty="0" smtClean="0"/>
+              <a:t>Project </a:t>
+            </a:r>
+            <a:r>
+              <a:rPr lang="en-GB" dirty="0"/>
+              <a:t>Magenta FSUIPC </a:t>
+            </a:r>
+            <a:r>
+              <a:rPr lang="en-GB" dirty="0" smtClean="0"/>
+              <a:t>Offset</a:t>
+            </a:r>
+            <a:endParaRPr lang="nl-NL" dirty="0"/>
+          </a:p>
+        </p:txBody>
+      </p:sp>
+      <p:sp>
+        <p:nvSpPr>
+          <p:cNvPr id="6" name="Tekstvak 5"/>
+          <p:cNvSpPr txBox="1"/>
+          <p:nvPr/>
+        </p:nvSpPr>
+        <p:spPr>
+          <a:xfrm>
+            <a:off x="1331640" y="3057654"/>
+            <a:ext cx="2880320" cy="369332"/>
+          </a:xfrm>
+          <a:prstGeom prst="rect">
+            <a:avLst/>
+          </a:prstGeom>
+          <a:noFill/>
+        </p:spPr>
+        <p:txBody>
+          <a:bodyPr wrap="square" rtlCol="0">
+            <a:spAutoFit/>
+          </a:bodyPr>
+          <a:lstStyle/>
+          <a:p>
+            <a:r>
+              <a:rPr lang="nl-NL" dirty="0" err="1" smtClean="0"/>
+              <a:t>EventID</a:t>
+            </a:r>
+            <a:endParaRPr lang="nl-NL" dirty="0"/>
+          </a:p>
+        </p:txBody>
+      </p:sp>
+      <p:sp>
+        <p:nvSpPr>
+          <p:cNvPr id="7" name="Tekstvak 6"/>
+          <p:cNvSpPr txBox="1"/>
+          <p:nvPr/>
+        </p:nvSpPr>
+        <p:spPr>
+          <a:xfrm>
+            <a:off x="5220072" y="3221360"/>
+            <a:ext cx="652743" cy="369332"/>
+          </a:xfrm>
+          <a:prstGeom prst="rect">
+            <a:avLst/>
+          </a:prstGeom>
+          <a:noFill/>
+        </p:spPr>
+        <p:txBody>
+          <a:bodyPr wrap="square" rtlCol="0">
+            <a:spAutoFit/>
+          </a:bodyPr>
+          <a:lstStyle/>
+          <a:p>
+            <a:r>
+              <a:rPr lang="nl-NL" dirty="0"/>
+              <a:t>0</a:t>
+            </a:r>
+          </a:p>
+        </p:txBody>
+      </p:sp>
+      <p:sp>
+        <p:nvSpPr>
+          <p:cNvPr id="8" name="Tekstvak 7"/>
+          <p:cNvSpPr txBox="1"/>
+          <p:nvPr/>
+        </p:nvSpPr>
+        <p:spPr>
+          <a:xfrm>
+            <a:off x="1331640" y="1772816"/>
+            <a:ext cx="2880320" cy="369332"/>
+          </a:xfrm>
+          <a:prstGeom prst="rect">
+            <a:avLst/>
+          </a:prstGeom>
+          <a:noFill/>
+        </p:spPr>
+        <p:txBody>
+          <a:bodyPr wrap="square" rtlCol="0">
+            <a:spAutoFit/>
+          </a:bodyPr>
+          <a:lstStyle/>
+          <a:p>
+            <a:r>
+              <a:rPr lang="nl-NL" dirty="0" err="1" smtClean="0"/>
+              <a:t>EventID</a:t>
+            </a:r>
+            <a:endParaRPr lang="nl-NL" dirty="0"/>
+          </a:p>
+        </p:txBody>
+      </p:sp>
+    </p:spTree>
+    <p:extLst>
+      <p:ext uri="{BB962C8B-B14F-4D97-AF65-F5344CB8AC3E}">
+        <p14:creationId xmlns:p14="http://schemas.microsoft.com/office/powerpoint/2010/main" val="316374724"/>
       </p:ext>
     </p:extLst>
   </p:cSld>

</xml_diff>